<commit_message>
Editing the Docs Minor changes in Main_ID
</commit_message>
<xml_diff>
--- a/Utilities/Instructions/classes/classes.pptx
+++ b/Utilities/Instructions/classes/classes.pptx
@@ -2315,6 +2315,81 @@
         </a:p>
       </dgm:t>
     </dgm:pt>
+    <dgm:pt modelId="{988AE5C6-DDD5-41AF-873F-CDFD8490291D}">
+      <dgm:prSet phldrT="[Text]" custT="1"/>
+      <dgm:spPr/>
+      <dgm:t>
+        <a:bodyPr/>
+        <a:lstStyle/>
+        <a:p>
+          <a:pPr algn="ctr" rtl="0"/>
+          <a:r>
+            <a:rPr lang="en-US" sz="1400" b="1"/>
+            <a:t>Class PhsrOutput</a:t>
+          </a:r>
+          <a:endParaRPr lang="en-US" sz="1400" dirty="0"/>
+        </a:p>
+      </dgm:t>
+    </dgm:pt>
+    <dgm:pt modelId="{650C4E55-868E-4B6E-8F6C-70827A912773}" type="parTrans" cxnId="{3C362CCD-CFF5-446D-83C8-9C67D00E47EF}">
+      <dgm:prSet/>
+      <dgm:spPr/>
+      <dgm:t>
+        <a:bodyPr/>
+        <a:lstStyle/>
+        <a:p>
+          <a:endParaRPr lang="en-US"/>
+        </a:p>
+      </dgm:t>
+    </dgm:pt>
+    <dgm:pt modelId="{9FAD5322-A187-43AB-81C2-6B83783C7D24}" type="sibTrans" cxnId="{3C362CCD-CFF5-446D-83C8-9C67D00E47EF}">
+      <dgm:prSet/>
+      <dgm:spPr/>
+      <dgm:t>
+        <a:bodyPr/>
+        <a:lstStyle/>
+        <a:p>
+          <a:endParaRPr lang="en-US"/>
+        </a:p>
+      </dgm:t>
+    </dgm:pt>
+    <dgm:pt modelId="{B130D577-C181-4F6D-AC09-CE1C38DA9C8D}">
+      <dgm:prSet phldrT="[Text]" custT="1"/>
+      <dgm:spPr/>
+      <dgm:t>
+        <a:bodyPr/>
+        <a:lstStyle/>
+        <a:p>
+          <a:pPr algn="ctr" rtl="0"/>
+          <a:r>
+            <a:rPr lang="en-US" sz="1400" dirty="0"/>
+            <a:t>Output list with all the info from Phaser</a:t>
+          </a:r>
+        </a:p>
+      </dgm:t>
+    </dgm:pt>
+    <dgm:pt modelId="{B34EED1C-6736-4F18-9AA1-623DDBF44A8C}" type="parTrans" cxnId="{D5E1B86B-D0DB-4B7B-BEA7-E2B3C7CA614A}">
+      <dgm:prSet/>
+      <dgm:spPr/>
+      <dgm:t>
+        <a:bodyPr/>
+        <a:lstStyle/>
+        <a:p>
+          <a:endParaRPr lang="en-US"/>
+        </a:p>
+      </dgm:t>
+    </dgm:pt>
+    <dgm:pt modelId="{0DDF8978-9D69-4D7E-95EF-B522E40D1228}" type="sibTrans" cxnId="{D5E1B86B-D0DB-4B7B-BEA7-E2B3C7CA614A}">
+      <dgm:prSet/>
+      <dgm:spPr/>
+      <dgm:t>
+        <a:bodyPr/>
+        <a:lstStyle/>
+        <a:p>
+          <a:endParaRPr lang="en-US"/>
+        </a:p>
+      </dgm:t>
+    </dgm:pt>
     <dgm:pt modelId="{8FF893B5-F116-47BD-BD0A-6292E77540BA}" type="pres">
       <dgm:prSet presAssocID="{64DB1CB9-4310-4DB0-A170-C70424FA7C9A}" presName="hierChild1" presStyleCnt="0">
         <dgm:presLayoutVars>
@@ -2357,7 +2432,7 @@
       <dgm:spPr/>
     </dgm:pt>
     <dgm:pt modelId="{177199FA-9F19-400E-A961-2B3AE2745D5F}" type="pres">
-      <dgm:prSet presAssocID="{4B70991C-9634-406E-A7F6-6FE37412B701}" presName="Name37" presStyleLbl="parChTrans1D2" presStyleIdx="0" presStyleCnt="5"/>
+      <dgm:prSet presAssocID="{4B70991C-9634-406E-A7F6-6FE37412B701}" presName="Name37" presStyleLbl="parChTrans1D2" presStyleIdx="0" presStyleCnt="6"/>
       <dgm:spPr/>
     </dgm:pt>
     <dgm:pt modelId="{35F06697-3895-4A49-865E-0857BC05BB58}" type="pres">
@@ -2373,7 +2448,7 @@
       <dgm:spPr/>
     </dgm:pt>
     <dgm:pt modelId="{CA1F7424-3DD7-40E9-825C-9CAEA377D9AC}" type="pres">
-      <dgm:prSet presAssocID="{41DF25B2-994D-4B96-8D73-B7E011D8EB1D}" presName="rootText" presStyleLbl="node2" presStyleIdx="0" presStyleCnt="5">
+      <dgm:prSet presAssocID="{41DF25B2-994D-4B96-8D73-B7E011D8EB1D}" presName="rootText" presStyleLbl="node2" presStyleIdx="0" presStyleCnt="6">
         <dgm:presLayoutVars>
           <dgm:chPref val="3"/>
         </dgm:presLayoutVars>
@@ -2381,7 +2456,7 @@
       <dgm:spPr/>
     </dgm:pt>
     <dgm:pt modelId="{2D41F315-25F7-4D8E-89CC-DBED89BD673A}" type="pres">
-      <dgm:prSet presAssocID="{41DF25B2-994D-4B96-8D73-B7E011D8EB1D}" presName="rootConnector" presStyleLbl="node2" presStyleIdx="0" presStyleCnt="5"/>
+      <dgm:prSet presAssocID="{41DF25B2-994D-4B96-8D73-B7E011D8EB1D}" presName="rootConnector" presStyleLbl="node2" presStyleIdx="0" presStyleCnt="6"/>
       <dgm:spPr/>
     </dgm:pt>
     <dgm:pt modelId="{647756F6-1B21-49FD-B779-33C584EEA3AA}" type="pres">
@@ -2389,7 +2464,7 @@
       <dgm:spPr/>
     </dgm:pt>
     <dgm:pt modelId="{E26CD382-2A29-41E2-93C4-489A071E0606}" type="pres">
-      <dgm:prSet presAssocID="{F1880794-B573-4CF8-A971-5303D10CDBAC}" presName="Name37" presStyleLbl="parChTrans1D3" presStyleIdx="0" presStyleCnt="5"/>
+      <dgm:prSet presAssocID="{F1880794-B573-4CF8-A971-5303D10CDBAC}" presName="Name37" presStyleLbl="parChTrans1D3" presStyleIdx="0" presStyleCnt="6"/>
       <dgm:spPr/>
     </dgm:pt>
     <dgm:pt modelId="{B5C24A73-47ED-431F-A421-7E4723DB4C5E}" type="pres">
@@ -2405,7 +2480,7 @@
       <dgm:spPr/>
     </dgm:pt>
     <dgm:pt modelId="{FFE19F79-B535-4863-B4C1-1FF8E2C5BB5C}" type="pres">
-      <dgm:prSet presAssocID="{06FC4B56-33C3-42C2-B905-FF26B3294FC9}" presName="rootText" presStyleLbl="node3" presStyleIdx="0" presStyleCnt="5">
+      <dgm:prSet presAssocID="{06FC4B56-33C3-42C2-B905-FF26B3294FC9}" presName="rootText" presStyleLbl="node3" presStyleIdx="0" presStyleCnt="6">
         <dgm:presLayoutVars>
           <dgm:chPref val="3"/>
         </dgm:presLayoutVars>
@@ -2413,7 +2488,7 @@
       <dgm:spPr/>
     </dgm:pt>
     <dgm:pt modelId="{A070CBC2-14EC-4A9F-9BE4-EBF7326E1714}" type="pres">
-      <dgm:prSet presAssocID="{06FC4B56-33C3-42C2-B905-FF26B3294FC9}" presName="rootConnector" presStyleLbl="node3" presStyleIdx="0" presStyleCnt="5"/>
+      <dgm:prSet presAssocID="{06FC4B56-33C3-42C2-B905-FF26B3294FC9}" presName="rootConnector" presStyleLbl="node3" presStyleIdx="0" presStyleCnt="6"/>
       <dgm:spPr/>
     </dgm:pt>
     <dgm:pt modelId="{A085BD18-B427-4EA4-BED8-8ABD637EF718}" type="pres">
@@ -2461,7 +2536,7 @@
       <dgm:spPr/>
     </dgm:pt>
     <dgm:pt modelId="{5338CB64-B33A-4BED-ACE3-6D3BF3602705}" type="pres">
-      <dgm:prSet presAssocID="{4A766C71-EB23-4D95-B9F6-6C660C3ECD8B}" presName="Name37" presStyleLbl="parChTrans1D3" presStyleIdx="1" presStyleCnt="5"/>
+      <dgm:prSet presAssocID="{4A766C71-EB23-4D95-B9F6-6C660C3ECD8B}" presName="Name37" presStyleLbl="parChTrans1D3" presStyleIdx="1" presStyleCnt="6"/>
       <dgm:spPr/>
     </dgm:pt>
     <dgm:pt modelId="{F603711F-F085-4153-8C7E-9D35C7D15568}" type="pres">
@@ -2477,7 +2552,7 @@
       <dgm:spPr/>
     </dgm:pt>
     <dgm:pt modelId="{6ACF9E05-724A-416E-ABB4-CF8C47774BA8}" type="pres">
-      <dgm:prSet presAssocID="{E27618FA-829E-4A6B-911F-8A52EBF04BF5}" presName="rootText" presStyleLbl="node3" presStyleIdx="1" presStyleCnt="5">
+      <dgm:prSet presAssocID="{E27618FA-829E-4A6B-911F-8A52EBF04BF5}" presName="rootText" presStyleLbl="node3" presStyleIdx="1" presStyleCnt="6">
         <dgm:presLayoutVars>
           <dgm:chPref val="3"/>
         </dgm:presLayoutVars>
@@ -2485,7 +2560,7 @@
       <dgm:spPr/>
     </dgm:pt>
     <dgm:pt modelId="{AFCFFD40-0ACE-4B28-BA86-2A5868209EB7}" type="pres">
-      <dgm:prSet presAssocID="{E27618FA-829E-4A6B-911F-8A52EBF04BF5}" presName="rootConnector" presStyleLbl="node3" presStyleIdx="1" presStyleCnt="5"/>
+      <dgm:prSet presAssocID="{E27618FA-829E-4A6B-911F-8A52EBF04BF5}" presName="rootConnector" presStyleLbl="node3" presStyleIdx="1" presStyleCnt="6"/>
       <dgm:spPr/>
     </dgm:pt>
     <dgm:pt modelId="{AA2CBD5D-F35C-49D0-957E-9D0E3788D9A0}" type="pres">
@@ -2509,7 +2584,7 @@
       <dgm:spPr/>
     </dgm:pt>
     <dgm:pt modelId="{2E89FA2F-74F9-4765-B9E3-98D7DBD656AC}" type="pres">
-      <dgm:prSet presAssocID="{BECE908C-165B-47F8-AD3F-F48300269308}" presName="rootText" presStyleLbl="node4" presStyleIdx="1" presStyleCnt="3" custScaleY="205023">
+      <dgm:prSet presAssocID="{BECE908C-165B-47F8-AD3F-F48300269308}" presName="rootText" presStyleLbl="node4" presStyleIdx="1" presStyleCnt="3" custScaleY="339411">
         <dgm:presLayoutVars>
           <dgm:chPref val="3"/>
         </dgm:presLayoutVars>
@@ -2537,7 +2612,7 @@
       <dgm:spPr/>
     </dgm:pt>
     <dgm:pt modelId="{D3B7F450-9734-4EE7-9DDB-0C063BC7283C}" type="pres">
-      <dgm:prSet presAssocID="{E7BF0574-D4DB-494C-B6E3-F31072AB75C3}" presName="Name37" presStyleLbl="parChTrans1D2" presStyleIdx="1" presStyleCnt="5"/>
+      <dgm:prSet presAssocID="{E7BF0574-D4DB-494C-B6E3-F31072AB75C3}" presName="Name37" presStyleLbl="parChTrans1D2" presStyleIdx="1" presStyleCnt="6"/>
       <dgm:spPr/>
     </dgm:pt>
     <dgm:pt modelId="{829124B6-0FBD-4771-BAB5-85E660C4C0D5}" type="pres">
@@ -2553,7 +2628,7 @@
       <dgm:spPr/>
     </dgm:pt>
     <dgm:pt modelId="{CC1418D4-4CBD-4B61-BC61-6226E3116DFA}" type="pres">
-      <dgm:prSet presAssocID="{CCC285BE-27F8-4B7A-B0FD-AB6D18E8533E}" presName="rootText" presStyleLbl="node2" presStyleIdx="1" presStyleCnt="5">
+      <dgm:prSet presAssocID="{CCC285BE-27F8-4B7A-B0FD-AB6D18E8533E}" presName="rootText" presStyleLbl="node2" presStyleIdx="1" presStyleCnt="6">
         <dgm:presLayoutVars>
           <dgm:chPref val="3"/>
         </dgm:presLayoutVars>
@@ -2561,7 +2636,7 @@
       <dgm:spPr/>
     </dgm:pt>
     <dgm:pt modelId="{A04518F5-A788-4643-A8DF-898FAB6D3F7B}" type="pres">
-      <dgm:prSet presAssocID="{CCC285BE-27F8-4B7A-B0FD-AB6D18E8533E}" presName="rootConnector" presStyleLbl="node2" presStyleIdx="1" presStyleCnt="5"/>
+      <dgm:prSet presAssocID="{CCC285BE-27F8-4B7A-B0FD-AB6D18E8533E}" presName="rootConnector" presStyleLbl="node2" presStyleIdx="1" presStyleCnt="6"/>
       <dgm:spPr/>
     </dgm:pt>
     <dgm:pt modelId="{22582729-D103-4810-92E0-ACF46AA961CE}" type="pres">
@@ -2569,7 +2644,7 @@
       <dgm:spPr/>
     </dgm:pt>
     <dgm:pt modelId="{FBBEC861-BB57-4C30-A72B-B31BC72F3720}" type="pres">
-      <dgm:prSet presAssocID="{A21E556F-24FD-4FC3-BA48-3C6D6250622E}" presName="Name37" presStyleLbl="parChTrans1D3" presStyleIdx="2" presStyleCnt="5"/>
+      <dgm:prSet presAssocID="{A21E556F-24FD-4FC3-BA48-3C6D6250622E}" presName="Name37" presStyleLbl="parChTrans1D3" presStyleIdx="2" presStyleCnt="6"/>
       <dgm:spPr/>
     </dgm:pt>
     <dgm:pt modelId="{5539B797-FF9B-43E5-A154-4D3E1A94808C}" type="pres">
@@ -2585,7 +2660,7 @@
       <dgm:spPr/>
     </dgm:pt>
     <dgm:pt modelId="{90C65C7C-388A-4FF7-9C94-918F2FEAB691}" type="pres">
-      <dgm:prSet presAssocID="{751469AB-D165-4EC6-BBD9-892C3B2FAC33}" presName="rootText" presStyleLbl="node3" presStyleIdx="2" presStyleCnt="5" custScaleX="121000" custScaleY="139119">
+      <dgm:prSet presAssocID="{751469AB-D165-4EC6-BBD9-892C3B2FAC33}" presName="rootText" presStyleLbl="node3" presStyleIdx="2" presStyleCnt="6" custScaleX="121000" custScaleY="139119">
         <dgm:presLayoutVars>
           <dgm:chPref val="3"/>
         </dgm:presLayoutVars>
@@ -2593,7 +2668,7 @@
       <dgm:spPr/>
     </dgm:pt>
     <dgm:pt modelId="{FAF85B28-4734-4887-8AB6-0CD918DD9BD7}" type="pres">
-      <dgm:prSet presAssocID="{751469AB-D165-4EC6-BBD9-892C3B2FAC33}" presName="rootConnector" presStyleLbl="node3" presStyleIdx="2" presStyleCnt="5"/>
+      <dgm:prSet presAssocID="{751469AB-D165-4EC6-BBD9-892C3B2FAC33}" presName="rootConnector" presStyleLbl="node3" presStyleIdx="2" presStyleCnt="6"/>
       <dgm:spPr/>
     </dgm:pt>
     <dgm:pt modelId="{38A9DA92-07C3-447C-9264-AA29473CD6ED}" type="pres">
@@ -2609,7 +2684,7 @@
       <dgm:spPr/>
     </dgm:pt>
     <dgm:pt modelId="{294FF083-72AC-4592-9D4B-A62942A4F058}" type="pres">
-      <dgm:prSet presAssocID="{B819F912-2C67-49A8-AF17-049A88347123}" presName="Name37" presStyleLbl="parChTrans1D2" presStyleIdx="2" presStyleCnt="5"/>
+      <dgm:prSet presAssocID="{B819F912-2C67-49A8-AF17-049A88347123}" presName="Name37" presStyleLbl="parChTrans1D2" presStyleIdx="2" presStyleCnt="6"/>
       <dgm:spPr/>
     </dgm:pt>
     <dgm:pt modelId="{A913C26F-99E0-4572-98FB-1E0FE3A2E522}" type="pres">
@@ -2625,7 +2700,7 @@
       <dgm:spPr/>
     </dgm:pt>
     <dgm:pt modelId="{C668CE75-5F45-4F07-8A39-54FF0948F513}" type="pres">
-      <dgm:prSet presAssocID="{2E2E0F0D-6F36-495E-8C35-5785AB56C97B}" presName="rootText" presStyleLbl="node2" presStyleIdx="2" presStyleCnt="5">
+      <dgm:prSet presAssocID="{2E2E0F0D-6F36-495E-8C35-5785AB56C97B}" presName="rootText" presStyleLbl="node2" presStyleIdx="2" presStyleCnt="6">
         <dgm:presLayoutVars>
           <dgm:chPref val="3"/>
         </dgm:presLayoutVars>
@@ -2633,7 +2708,7 @@
       <dgm:spPr/>
     </dgm:pt>
     <dgm:pt modelId="{E6241A6E-F506-435F-9669-5DC1EC405E8C}" type="pres">
-      <dgm:prSet presAssocID="{2E2E0F0D-6F36-495E-8C35-5785AB56C97B}" presName="rootConnector" presStyleLbl="node2" presStyleIdx="2" presStyleCnt="5"/>
+      <dgm:prSet presAssocID="{2E2E0F0D-6F36-495E-8C35-5785AB56C97B}" presName="rootConnector" presStyleLbl="node2" presStyleIdx="2" presStyleCnt="6"/>
       <dgm:spPr/>
     </dgm:pt>
     <dgm:pt modelId="{36C55FAD-2914-4BDA-AE24-C7F45E0039C2}" type="pres">
@@ -2641,7 +2716,7 @@
       <dgm:spPr/>
     </dgm:pt>
     <dgm:pt modelId="{DA39AD2B-53B1-4B12-8665-AF4B29F307FB}" type="pres">
-      <dgm:prSet presAssocID="{1BB7AF13-049E-40F7-9CAB-479748FAB7FF}" presName="Name37" presStyleLbl="parChTrans1D3" presStyleIdx="3" presStyleCnt="5"/>
+      <dgm:prSet presAssocID="{1BB7AF13-049E-40F7-9CAB-479748FAB7FF}" presName="Name37" presStyleLbl="parChTrans1D3" presStyleIdx="3" presStyleCnt="6"/>
       <dgm:spPr/>
     </dgm:pt>
     <dgm:pt modelId="{253DE851-C592-45C8-9AE6-63554E5B2B74}" type="pres">
@@ -2657,7 +2732,7 @@
       <dgm:spPr/>
     </dgm:pt>
     <dgm:pt modelId="{892BD28F-03E1-4D71-AD0F-AAFD29BCD7DF}" type="pres">
-      <dgm:prSet presAssocID="{D4E665BE-7CF3-4DBE-83B8-A866A5CD835F}" presName="rootText" presStyleLbl="node3" presStyleIdx="3" presStyleCnt="5">
+      <dgm:prSet presAssocID="{D4E665BE-7CF3-4DBE-83B8-A866A5CD835F}" presName="rootText" presStyleLbl="node3" presStyleIdx="3" presStyleCnt="6" custScaleY="135434">
         <dgm:presLayoutVars>
           <dgm:chPref val="3"/>
         </dgm:presLayoutVars>
@@ -2665,7 +2740,7 @@
       <dgm:spPr/>
     </dgm:pt>
     <dgm:pt modelId="{396C34AD-EEFC-4B1C-84BC-869F399E8ED9}" type="pres">
-      <dgm:prSet presAssocID="{D4E665BE-7CF3-4DBE-83B8-A866A5CD835F}" presName="rootConnector" presStyleLbl="node3" presStyleIdx="3" presStyleCnt="5"/>
+      <dgm:prSet presAssocID="{D4E665BE-7CF3-4DBE-83B8-A866A5CD835F}" presName="rootConnector" presStyleLbl="node3" presStyleIdx="3" presStyleCnt="6"/>
       <dgm:spPr/>
     </dgm:pt>
     <dgm:pt modelId="{D6126C01-FB41-4768-A124-366EF1936F7C}" type="pres">
@@ -2678,6 +2753,78 @@
     </dgm:pt>
     <dgm:pt modelId="{231136D4-1B73-4DA2-B7CD-D91A16F99FE6}" type="pres">
       <dgm:prSet presAssocID="{2E2E0F0D-6F36-495E-8C35-5785AB56C97B}" presName="hierChild5" presStyleCnt="0"/>
+      <dgm:spPr/>
+    </dgm:pt>
+    <dgm:pt modelId="{6BD62762-A74B-4D5D-8EDB-0897C75ADE82}" type="pres">
+      <dgm:prSet presAssocID="{650C4E55-868E-4B6E-8F6C-70827A912773}" presName="Name37" presStyleLbl="parChTrans1D2" presStyleIdx="3" presStyleCnt="6"/>
+      <dgm:spPr/>
+    </dgm:pt>
+    <dgm:pt modelId="{8BA36EB3-DAEA-4AC5-AE99-AA43F1E32237}" type="pres">
+      <dgm:prSet presAssocID="{988AE5C6-DDD5-41AF-873F-CDFD8490291D}" presName="hierRoot2" presStyleCnt="0">
+        <dgm:presLayoutVars>
+          <dgm:hierBranch val="init"/>
+        </dgm:presLayoutVars>
+      </dgm:prSet>
+      <dgm:spPr/>
+    </dgm:pt>
+    <dgm:pt modelId="{4F89A336-9FE2-4F42-A330-52D6A2C5DC77}" type="pres">
+      <dgm:prSet presAssocID="{988AE5C6-DDD5-41AF-873F-CDFD8490291D}" presName="rootComposite" presStyleCnt="0"/>
+      <dgm:spPr/>
+    </dgm:pt>
+    <dgm:pt modelId="{95818E8C-F0F7-42E9-8C3D-12C643641ED5}" type="pres">
+      <dgm:prSet presAssocID="{988AE5C6-DDD5-41AF-873F-CDFD8490291D}" presName="rootText" presStyleLbl="node2" presStyleIdx="3" presStyleCnt="6">
+        <dgm:presLayoutVars>
+          <dgm:chPref val="3"/>
+        </dgm:presLayoutVars>
+      </dgm:prSet>
+      <dgm:spPr/>
+    </dgm:pt>
+    <dgm:pt modelId="{BE8D3007-A1C1-4926-ACBA-6BE297FC218E}" type="pres">
+      <dgm:prSet presAssocID="{988AE5C6-DDD5-41AF-873F-CDFD8490291D}" presName="rootConnector" presStyleLbl="node2" presStyleIdx="3" presStyleCnt="6"/>
+      <dgm:spPr/>
+    </dgm:pt>
+    <dgm:pt modelId="{59756FA6-B3C8-47C8-8988-0676103424AB}" type="pres">
+      <dgm:prSet presAssocID="{988AE5C6-DDD5-41AF-873F-CDFD8490291D}" presName="hierChild4" presStyleCnt="0"/>
+      <dgm:spPr/>
+    </dgm:pt>
+    <dgm:pt modelId="{06A4B5E5-63F5-4D43-85F9-A5086BC312FD}" type="pres">
+      <dgm:prSet presAssocID="{B34EED1C-6736-4F18-9AA1-623DDBF44A8C}" presName="Name37" presStyleLbl="parChTrans1D3" presStyleIdx="4" presStyleCnt="6"/>
+      <dgm:spPr/>
+    </dgm:pt>
+    <dgm:pt modelId="{A4E93967-B642-4E18-B3BB-1FEDE6C5A64E}" type="pres">
+      <dgm:prSet presAssocID="{B130D577-C181-4F6D-AC09-CE1C38DA9C8D}" presName="hierRoot2" presStyleCnt="0">
+        <dgm:presLayoutVars>
+          <dgm:hierBranch val="init"/>
+        </dgm:presLayoutVars>
+      </dgm:prSet>
+      <dgm:spPr/>
+    </dgm:pt>
+    <dgm:pt modelId="{85E87F8D-DF54-4335-99B5-461383867094}" type="pres">
+      <dgm:prSet presAssocID="{B130D577-C181-4F6D-AC09-CE1C38DA9C8D}" presName="rootComposite" presStyleCnt="0"/>
+      <dgm:spPr/>
+    </dgm:pt>
+    <dgm:pt modelId="{C4412BE2-ECCF-406E-AA8E-B74753721C46}" type="pres">
+      <dgm:prSet presAssocID="{B130D577-C181-4F6D-AC09-CE1C38DA9C8D}" presName="rootText" presStyleLbl="node3" presStyleIdx="4" presStyleCnt="6" custScaleY="218077">
+        <dgm:presLayoutVars>
+          <dgm:chPref val="3"/>
+        </dgm:presLayoutVars>
+      </dgm:prSet>
+      <dgm:spPr/>
+    </dgm:pt>
+    <dgm:pt modelId="{6B947019-3E19-4EA0-BC88-C55D27554B62}" type="pres">
+      <dgm:prSet presAssocID="{B130D577-C181-4F6D-AC09-CE1C38DA9C8D}" presName="rootConnector" presStyleLbl="node3" presStyleIdx="4" presStyleCnt="6"/>
+      <dgm:spPr/>
+    </dgm:pt>
+    <dgm:pt modelId="{904CF44F-1A43-48C2-80EA-FDCB21FAC775}" type="pres">
+      <dgm:prSet presAssocID="{B130D577-C181-4F6D-AC09-CE1C38DA9C8D}" presName="hierChild4" presStyleCnt="0"/>
+      <dgm:spPr/>
+    </dgm:pt>
+    <dgm:pt modelId="{1F8DD891-1B3D-48AA-A014-82FFC477FFAA}" type="pres">
+      <dgm:prSet presAssocID="{B130D577-C181-4F6D-AC09-CE1C38DA9C8D}" presName="hierChild5" presStyleCnt="0"/>
+      <dgm:spPr/>
+    </dgm:pt>
+    <dgm:pt modelId="{CA1A08E2-0763-4996-9872-4EB6A1CD1B3F}" type="pres">
+      <dgm:prSet presAssocID="{988AE5C6-DDD5-41AF-873F-CDFD8490291D}" presName="hierChild5" presStyleCnt="0"/>
       <dgm:spPr/>
     </dgm:pt>
     <dgm:pt modelId="{086F99DF-9E27-4DA4-BB0F-8F5C8CD4BCC9}" type="pres">
@@ -2713,7 +2860,7 @@
       <dgm:spPr/>
     </dgm:pt>
     <dgm:pt modelId="{4BCD16C6-25C9-4770-AD84-F75FC7CEE244}" type="pres">
-      <dgm:prSet presAssocID="{97FFE5E7-651C-49D0-BD06-55501B8B4DB1}" presName="Name37" presStyleLbl="parChTrans1D2" presStyleIdx="3" presStyleCnt="5"/>
+      <dgm:prSet presAssocID="{97FFE5E7-651C-49D0-BD06-55501B8B4DB1}" presName="Name37" presStyleLbl="parChTrans1D2" presStyleIdx="4" presStyleCnt="6"/>
       <dgm:spPr/>
     </dgm:pt>
     <dgm:pt modelId="{D39C6C61-CC49-4129-B65A-0244BC2E9FD3}" type="pres">
@@ -2729,7 +2876,7 @@
       <dgm:spPr/>
     </dgm:pt>
     <dgm:pt modelId="{9CB5ECF4-EE43-4B72-88EF-67DE06ABB8A3}" type="pres">
-      <dgm:prSet presAssocID="{B46B4196-7934-41C3-A7CC-93294C24D967}" presName="rootText" presStyleLbl="node2" presStyleIdx="3" presStyleCnt="5">
+      <dgm:prSet presAssocID="{B46B4196-7934-41C3-A7CC-93294C24D967}" presName="rootText" presStyleLbl="node2" presStyleIdx="4" presStyleCnt="6">
         <dgm:presLayoutVars>
           <dgm:chPref val="3"/>
         </dgm:presLayoutVars>
@@ -2737,7 +2884,7 @@
       <dgm:spPr/>
     </dgm:pt>
     <dgm:pt modelId="{E91BB5CF-4DBE-4DC9-9A91-A474D6B40636}" type="pres">
-      <dgm:prSet presAssocID="{B46B4196-7934-41C3-A7CC-93294C24D967}" presName="rootConnector" presStyleLbl="node2" presStyleIdx="3" presStyleCnt="5"/>
+      <dgm:prSet presAssocID="{B46B4196-7934-41C3-A7CC-93294C24D967}" presName="rootConnector" presStyleLbl="node2" presStyleIdx="4" presStyleCnt="6"/>
       <dgm:spPr/>
     </dgm:pt>
     <dgm:pt modelId="{076BBBDD-2DDC-4782-A2F8-D148B320E0CA}" type="pres">
@@ -2745,7 +2892,7 @@
       <dgm:spPr/>
     </dgm:pt>
     <dgm:pt modelId="{1847C212-F8F5-413A-B274-02434669DE4A}" type="pres">
-      <dgm:prSet presAssocID="{F96DF90F-F99F-474F-B7BB-655F2930D89C}" presName="Name37" presStyleLbl="parChTrans1D3" presStyleIdx="4" presStyleCnt="5"/>
+      <dgm:prSet presAssocID="{F96DF90F-F99F-474F-B7BB-655F2930D89C}" presName="Name37" presStyleLbl="parChTrans1D3" presStyleIdx="5" presStyleCnt="6"/>
       <dgm:spPr/>
     </dgm:pt>
     <dgm:pt modelId="{E7F17E4B-90CD-4483-8D11-4D73AEBC666E}" type="pres">
@@ -2761,7 +2908,7 @@
       <dgm:spPr/>
     </dgm:pt>
     <dgm:pt modelId="{B1B496CD-0410-4073-9E57-D5D3BB85915D}" type="pres">
-      <dgm:prSet presAssocID="{15498E2D-CDEC-46E9-B130-3CDD51EB90EB}" presName="rootText" presStyleLbl="node3" presStyleIdx="4" presStyleCnt="5">
+      <dgm:prSet presAssocID="{15498E2D-CDEC-46E9-B130-3CDD51EB90EB}" presName="rootText" presStyleLbl="node3" presStyleIdx="5" presStyleCnt="6">
         <dgm:presLayoutVars>
           <dgm:chPref val="3"/>
         </dgm:presLayoutVars>
@@ -2769,7 +2916,7 @@
       <dgm:spPr/>
     </dgm:pt>
     <dgm:pt modelId="{A47D358A-1DA6-40D0-B686-D699486A2BF2}" type="pres">
-      <dgm:prSet presAssocID="{15498E2D-CDEC-46E9-B130-3CDD51EB90EB}" presName="rootConnector" presStyleLbl="node3" presStyleIdx="4" presStyleCnt="5"/>
+      <dgm:prSet presAssocID="{15498E2D-CDEC-46E9-B130-3CDD51EB90EB}" presName="rootConnector" presStyleLbl="node3" presStyleIdx="5" presStyleCnt="6"/>
       <dgm:spPr/>
     </dgm:pt>
     <dgm:pt modelId="{C45CA3E2-9969-430A-A4E9-E2350909EA6A}" type="pres">
@@ -2853,7 +3000,7 @@
       <dgm:spPr/>
     </dgm:pt>
     <dgm:pt modelId="{98BD8229-9168-424A-ADC7-680E770B0605}" type="pres">
-      <dgm:prSet presAssocID="{5DA2088A-4841-49BF-B858-8C3DF77AF483}" presName="Name37" presStyleLbl="parChTrans1D2" presStyleIdx="4" presStyleCnt="5"/>
+      <dgm:prSet presAssocID="{5DA2088A-4841-49BF-B858-8C3DF77AF483}" presName="Name37" presStyleLbl="parChTrans1D2" presStyleIdx="5" presStyleCnt="6"/>
       <dgm:spPr/>
     </dgm:pt>
     <dgm:pt modelId="{ADE535F3-33CD-4A76-8ED7-36E2EB27F70A}" type="pres">
@@ -2869,7 +3016,7 @@
       <dgm:spPr/>
     </dgm:pt>
     <dgm:pt modelId="{6BAD6C85-AEA6-421B-A9C9-082FF217BAC3}" type="pres">
-      <dgm:prSet presAssocID="{2F864E52-8A4E-4173-8EFD-0EAE88274AC0}" presName="rootText" presStyleLbl="node2" presStyleIdx="4" presStyleCnt="5">
+      <dgm:prSet presAssocID="{2F864E52-8A4E-4173-8EFD-0EAE88274AC0}" presName="rootText" presStyleLbl="node2" presStyleIdx="5" presStyleCnt="6">
         <dgm:presLayoutVars>
           <dgm:chPref val="3"/>
         </dgm:presLayoutVars>
@@ -2877,7 +3024,7 @@
       <dgm:spPr/>
     </dgm:pt>
     <dgm:pt modelId="{821D2609-AF75-4CCB-8B78-627177565257}" type="pres">
-      <dgm:prSet presAssocID="{2F864E52-8A4E-4173-8EFD-0EAE88274AC0}" presName="rootConnector" presStyleLbl="node2" presStyleIdx="4" presStyleCnt="5"/>
+      <dgm:prSet presAssocID="{2F864E52-8A4E-4173-8EFD-0EAE88274AC0}" presName="rootConnector" presStyleLbl="node2" presStyleIdx="5" presStyleCnt="6"/>
       <dgm:spPr/>
     </dgm:pt>
     <dgm:pt modelId="{3A194BE0-F9FD-4BF2-8F66-8A7294D83518}" type="pres">
@@ -2894,136 +3041,158 @@
     </dgm:pt>
   </dgm:ptLst>
   <dgm:cxnLst>
-    <dgm:cxn modelId="{B88C2B00-39BA-4E53-BA6C-689E4B985243}" type="presOf" srcId="{BECE908C-165B-47F8-AD3F-F48300269308}" destId="{31F30900-8B02-4BC1-9D2C-C5565E43B67E}" srcOrd="1" destOrd="0" presId="urn:microsoft.com/office/officeart/2005/8/layout/orgChart1"/>
+    <dgm:cxn modelId="{41B15202-C367-4798-91E4-12B8AE20E2AA}" type="presOf" srcId="{F1880794-B573-4CF8-A971-5303D10CDBAC}" destId="{E26CD382-2A29-41E2-93C4-489A071E0606}" srcOrd="0" destOrd="0" presId="urn:microsoft.com/office/officeart/2005/8/layout/orgChart1"/>
     <dgm:cxn modelId="{58D40203-41DB-4EC3-9168-233AE15C7908}" type="presOf" srcId="{B46B4196-7934-41C3-A7CC-93294C24D967}" destId="{E91BB5CF-4DBE-4DC9-9A91-A474D6B40636}" srcOrd="1" destOrd="0" presId="urn:microsoft.com/office/officeart/2005/8/layout/orgChart1"/>
-    <dgm:cxn modelId="{796E760C-7F81-4A2E-B173-1A3634CAC9C4}" type="presOf" srcId="{FB4A4402-DBB8-42C2-9236-AA7DFDF231E7}" destId="{C5557B50-17AD-4498-992D-799031EA5B37}" srcOrd="0" destOrd="0" presId="urn:microsoft.com/office/officeart/2005/8/layout/orgChart1"/>
-    <dgm:cxn modelId="{54C1A00E-449A-4C10-8FBC-52C887A90C77}" type="presOf" srcId="{4B70991C-9634-406E-A7F6-6FE37412B701}" destId="{177199FA-9F19-400E-A961-2B3AE2745D5F}" srcOrd="0" destOrd="0" presId="urn:microsoft.com/office/officeart/2005/8/layout/orgChart1"/>
-    <dgm:cxn modelId="{10F7E725-E49F-4D5B-BE38-2FEF3255FC76}" type="presOf" srcId="{E27618FA-829E-4A6B-911F-8A52EBF04BF5}" destId="{6ACF9E05-724A-416E-ABB4-CF8C47774BA8}" srcOrd="0" destOrd="0" presId="urn:microsoft.com/office/officeart/2005/8/layout/orgChart1"/>
+    <dgm:cxn modelId="{5275FD04-E0A3-41F4-BA55-A8418A8BEACC}" type="presOf" srcId="{E7BF0574-D4DB-494C-B6E3-F31072AB75C3}" destId="{D3B7F450-9734-4EE7-9DDB-0C063BC7283C}" srcOrd="0" destOrd="0" presId="urn:microsoft.com/office/officeart/2005/8/layout/orgChart1"/>
+    <dgm:cxn modelId="{39E9AA11-7595-491A-92A1-DB2D2F98FA2F}" type="presOf" srcId="{D4E665BE-7CF3-4DBE-83B8-A866A5CD835F}" destId="{396C34AD-EEFC-4B1C-84BC-869F399E8ED9}" srcOrd="1" destOrd="0" presId="urn:microsoft.com/office/officeart/2005/8/layout/orgChart1"/>
+    <dgm:cxn modelId="{95A72F1A-B5E2-43E1-BFB4-B45815FEF414}" type="presOf" srcId="{CCC285BE-27F8-4B7A-B0FD-AB6D18E8533E}" destId="{A04518F5-A788-4643-A8DF-898FAB6D3F7B}" srcOrd="1" destOrd="0" presId="urn:microsoft.com/office/officeart/2005/8/layout/orgChart1"/>
+    <dgm:cxn modelId="{E99CEE1C-E705-4468-909E-D0E73B2995CB}" type="presOf" srcId="{FB4A4402-DBB8-42C2-9236-AA7DFDF231E7}" destId="{AA289500-C62E-4335-99F0-3B71A01D0175}" srcOrd="1" destOrd="0" presId="urn:microsoft.com/office/officeart/2005/8/layout/orgChart1"/>
+    <dgm:cxn modelId="{B9FDB81E-6141-4437-AB68-3C46F25505E7}" type="presOf" srcId="{06FC4B56-33C3-42C2-B905-FF26B3294FC9}" destId="{FFE19F79-B535-4863-B4C1-1FF8E2C5BB5C}" srcOrd="0" destOrd="0" presId="urn:microsoft.com/office/officeart/2005/8/layout/orgChart1"/>
+    <dgm:cxn modelId="{6B2F6E25-FAAD-4817-A817-C0629EB67C41}" type="presOf" srcId="{4A766C71-EB23-4D95-B9F6-6C660C3ECD8B}" destId="{5338CB64-B33A-4BED-ACE3-6D3BF3602705}" srcOrd="0" destOrd="0" presId="urn:microsoft.com/office/officeart/2005/8/layout/orgChart1"/>
+    <dgm:cxn modelId="{B8403526-AD45-47E9-B02A-80A83BA847D9}" type="presOf" srcId="{E27618FA-829E-4A6B-911F-8A52EBF04BF5}" destId="{AFCFFD40-0ACE-4B28-BA86-2A5868209EB7}" srcOrd="1" destOrd="0" presId="urn:microsoft.com/office/officeart/2005/8/layout/orgChart1"/>
     <dgm:cxn modelId="{57B58C26-B88A-48E0-B4D1-406BB7BA83F5}" type="presOf" srcId="{15498E2D-CDEC-46E9-B130-3CDD51EB90EB}" destId="{B1B496CD-0410-4073-9E57-D5D3BB85915D}" srcOrd="0" destOrd="0" presId="urn:microsoft.com/office/officeart/2005/8/layout/orgChart1"/>
-    <dgm:cxn modelId="{DAEE8D2A-8E01-44F1-8A78-E48171966391}" type="presOf" srcId="{751469AB-D165-4EC6-BBD9-892C3B2FAC33}" destId="{90C65C7C-388A-4FF7-9C94-918F2FEAB691}" srcOrd="0" destOrd="0" presId="urn:microsoft.com/office/officeart/2005/8/layout/orgChart1"/>
     <dgm:cxn modelId="{F4CDDD2A-61BB-4E83-985B-BC352A8EC625}" type="presOf" srcId="{B81F65EE-4DFE-432D-A607-1171DCBBD919}" destId="{AF479728-0A08-4A5F-9649-F22656AEA8E8}" srcOrd="0" destOrd="0" presId="urn:microsoft.com/office/officeart/2005/8/layout/orgChart1"/>
+    <dgm:cxn modelId="{54DFE92C-D074-4E8F-980F-2F7CF552D9A7}" type="presOf" srcId="{988AE5C6-DDD5-41AF-873F-CDFD8490291D}" destId="{BE8D3007-A1C1-4926-ACBA-6BE297FC218E}" srcOrd="1" destOrd="0" presId="urn:microsoft.com/office/officeart/2005/8/layout/orgChart1"/>
     <dgm:cxn modelId="{AEFB5F33-3217-439F-8FC8-508882DD941A}" type="presOf" srcId="{83C88DCB-43CD-4934-9573-B7DE9060BB99}" destId="{591E2423-C3CD-45C9-8F8B-61967E6E076C}" srcOrd="1" destOrd="0" presId="urn:microsoft.com/office/officeart/2005/8/layout/orgChart1"/>
-    <dgm:cxn modelId="{96350037-056E-48D4-82DF-5B8BD37B8B9E}" type="presOf" srcId="{D4E665BE-7CF3-4DBE-83B8-A866A5CD835F}" destId="{396C34AD-EEFC-4B1C-84BC-869F399E8ED9}" srcOrd="1" destOrd="0" presId="urn:microsoft.com/office/officeart/2005/8/layout/orgChart1"/>
-    <dgm:cxn modelId="{F44B743D-10EC-4192-BB21-BA2E15BD303A}" type="presOf" srcId="{2E2E0F0D-6F36-495E-8C35-5785AB56C97B}" destId="{C668CE75-5F45-4F07-8A39-54FF0948F513}" srcOrd="0" destOrd="0" presId="urn:microsoft.com/office/officeart/2005/8/layout/orgChart1"/>
-    <dgm:cxn modelId="{3384F93D-F626-49EA-B951-D81AE2A8F186}" type="presOf" srcId="{E27618FA-829E-4A6B-911F-8A52EBF04BF5}" destId="{AFCFFD40-0ACE-4B28-BA86-2A5868209EB7}" srcOrd="1" destOrd="0" presId="urn:microsoft.com/office/officeart/2005/8/layout/orgChart1"/>
-    <dgm:cxn modelId="{EABAFF3E-AB37-4F4F-BA4D-CAFEA1DB26E4}" type="presOf" srcId="{06FC4B56-33C3-42C2-B905-FF26B3294FC9}" destId="{FFE19F79-B535-4863-B4C1-1FF8E2C5BB5C}" srcOrd="0" destOrd="0" presId="urn:microsoft.com/office/officeart/2005/8/layout/orgChart1"/>
+    <dgm:cxn modelId="{10A4D338-2548-4B2E-9BC5-4C17A49FE1A3}" type="presOf" srcId="{DB039CF0-B995-4962-A60F-DAF0FF97807C}" destId="{EF4DD7FF-F938-43A1-B5DD-E48D38FD6955}" srcOrd="0" destOrd="0" presId="urn:microsoft.com/office/officeart/2005/8/layout/orgChart1"/>
+    <dgm:cxn modelId="{C76A253C-9C5C-4930-A601-D2DBE0FB715B}" type="presOf" srcId="{4B70991C-9634-406E-A7F6-6FE37412B701}" destId="{177199FA-9F19-400E-A961-2B3AE2745D5F}" srcOrd="0" destOrd="0" presId="urn:microsoft.com/office/officeart/2005/8/layout/orgChart1"/>
+    <dgm:cxn modelId="{5E956041-77B2-4A88-8023-390CE4AAD8AB}" type="presOf" srcId="{B819F912-2C67-49A8-AF17-049A88347123}" destId="{294FF083-72AC-4592-9D4B-A62942A4F058}" srcOrd="0" destOrd="0" presId="urn:microsoft.com/office/officeart/2005/8/layout/orgChart1"/>
     <dgm:cxn modelId="{DE851F63-BB6C-426F-8E70-194C2F45BAF2}" srcId="{64DB1CB9-4310-4DB0-A170-C70424FA7C9A}" destId="{83C88DCB-43CD-4934-9573-B7DE9060BB99}" srcOrd="2" destOrd="0" parTransId="{8F4AF318-6354-4E2C-8D78-0F8429373C2D}" sibTransId="{A10932F9-F0B8-4DEC-AACC-73A603934C62}"/>
     <dgm:cxn modelId="{01A98943-00E5-45F5-AC8F-F4BFAFEA1708}" srcId="{7BC84D3C-6D3F-4F65-AAFB-6664EF76B498}" destId="{2E2E0F0D-6F36-495E-8C35-5785AB56C97B}" srcOrd="2" destOrd="0" parTransId="{B819F912-2C67-49A8-AF17-049A88347123}" sibTransId="{262C04A9-AEDF-4D0B-BFB5-F4AE33767CB3}"/>
     <dgm:cxn modelId="{4ADFCE63-E230-4C5B-9814-E1B5ED8552FC}" type="presOf" srcId="{5DA2088A-4841-49BF-B858-8C3DF77AF483}" destId="{98BD8229-9168-424A-ADC7-680E770B0605}" srcOrd="0" destOrd="0" presId="urn:microsoft.com/office/officeart/2005/8/layout/orgChart1"/>
     <dgm:cxn modelId="{23090364-9D42-46B2-A134-26E04B02B7B3}" srcId="{15498E2D-CDEC-46E9-B130-3CDD51EB90EB}" destId="{D08377C1-26E2-421B-9A90-3FFE9FC10408}" srcOrd="0" destOrd="0" parTransId="{B81F65EE-4DFE-432D-A607-1171DCBBD919}" sibTransId="{FE9FB200-B4A3-49FC-B9EE-9B62E889F52E}"/>
+    <dgm:cxn modelId="{F2766C46-76F1-4572-8DA1-9EB5B870598A}" type="presOf" srcId="{04A08845-3B72-4FB6-A4E7-88CC653CE0BA}" destId="{878E4F0B-3E20-4424-94B0-EBBA8BFE388B}" srcOrd="0" destOrd="0" presId="urn:microsoft.com/office/officeart/2005/8/layout/orgChart1"/>
     <dgm:cxn modelId="{35EACA47-54A2-4FAD-A94F-992F8E91514A}" srcId="{06FC4B56-33C3-42C2-B905-FF26B3294FC9}" destId="{FB4A4402-DBB8-42C2-9236-AA7DFDF231E7}" srcOrd="0" destOrd="0" parTransId="{DB039CF0-B995-4962-A60F-DAF0FF97807C}" sibTransId="{1311FA4F-58C8-4CCC-936F-6D4BB4061985}"/>
     <dgm:cxn modelId="{9C83F167-21DE-4CEF-AC54-0D6D80DBF228}" srcId="{CCC285BE-27F8-4B7A-B0FD-AB6D18E8533E}" destId="{751469AB-D165-4EC6-BBD9-892C3B2FAC33}" srcOrd="0" destOrd="0" parTransId="{A21E556F-24FD-4FC3-BA48-3C6D6250622E}" sibTransId="{A7113486-2C96-47CA-8BBF-AA880667E0AE}"/>
     <dgm:cxn modelId="{EDEFED48-1A51-4096-B8C7-C62F57128EC4}" type="presOf" srcId="{D08377C1-26E2-421B-9A90-3FFE9FC10408}" destId="{D8294610-CF66-4D6D-8CF8-4B0522858E45}" srcOrd="1" destOrd="0" presId="urn:microsoft.com/office/officeart/2005/8/layout/orgChart1"/>
-    <dgm:cxn modelId="{F48F416C-8FD3-4E47-BB69-0618A0FF0CFD}" type="presOf" srcId="{D4E665BE-7CF3-4DBE-83B8-A866A5CD835F}" destId="{892BD28F-03E1-4D71-AD0F-AAFD29BCD7DF}" srcOrd="0" destOrd="0" presId="urn:microsoft.com/office/officeart/2005/8/layout/orgChart1"/>
+    <dgm:cxn modelId="{D5E1B86B-D0DB-4B7B-BEA7-E2B3C7CA614A}" srcId="{988AE5C6-DDD5-41AF-873F-CDFD8490291D}" destId="{B130D577-C181-4F6D-AC09-CE1C38DA9C8D}" srcOrd="0" destOrd="0" parTransId="{B34EED1C-6736-4F18-9AA1-623DDBF44A8C}" sibTransId="{0DDF8978-9D69-4D7E-95EF-B522E40D1228}"/>
     <dgm:cxn modelId="{F62EA84F-AE88-4B84-A156-621633D6864B}" type="presOf" srcId="{83C88DCB-43CD-4934-9573-B7DE9060BB99}" destId="{6BB90D32-3A50-4834-BF3A-ADCBB4AEAC74}" srcOrd="0" destOrd="0" presId="urn:microsoft.com/office/officeart/2005/8/layout/orgChart1"/>
     <dgm:cxn modelId="{4BC00C70-183C-426B-A845-DC4A7C61F20C}" srcId="{8953BB72-D521-4DFE-9EFF-AECF2A87B7A1}" destId="{B46B4196-7934-41C3-A7CC-93294C24D967}" srcOrd="0" destOrd="0" parTransId="{97FFE5E7-651C-49D0-BD06-55501B8B4DB1}" sibTransId="{83BCA3F1-5910-4D30-851D-1748295954A3}"/>
+    <dgm:cxn modelId="{2697EE70-1A1D-4DEE-9041-92367D58AA0C}" type="presOf" srcId="{41DF25B2-994D-4B96-8D73-B7E011D8EB1D}" destId="{CA1F7424-3DD7-40E9-825C-9CAEA377D9AC}" srcOrd="0" destOrd="0" presId="urn:microsoft.com/office/officeart/2005/8/layout/orgChart1"/>
     <dgm:cxn modelId="{D0979271-9F31-4C2F-98C4-8AD41CF142BF}" type="presOf" srcId="{7BC84D3C-6D3F-4F65-AAFB-6664EF76B498}" destId="{FA9804DD-40AB-4677-A1BC-173CBF1D1729}" srcOrd="0" destOrd="0" presId="urn:microsoft.com/office/officeart/2005/8/layout/orgChart1"/>
-    <dgm:cxn modelId="{8603D372-2F39-4CCD-8FA3-CF69B3B2FEAE}" type="presOf" srcId="{CCC285BE-27F8-4B7A-B0FD-AB6D18E8533E}" destId="{A04518F5-A788-4643-A8DF-898FAB6D3F7B}" srcOrd="1" destOrd="0" presId="urn:microsoft.com/office/officeart/2005/8/layout/orgChart1"/>
     <dgm:cxn modelId="{06ECB853-C4F7-4760-A05B-5AA72103D012}" type="presOf" srcId="{15498E2D-CDEC-46E9-B130-3CDD51EB90EB}" destId="{A47D358A-1DA6-40D0-B686-D699486A2BF2}" srcOrd="1" destOrd="0" presId="urn:microsoft.com/office/officeart/2005/8/layout/orgChart1"/>
-    <dgm:cxn modelId="{560DBF54-F16C-41E4-AE9F-C8211B7B6BC6}" type="presOf" srcId="{06FC4B56-33C3-42C2-B905-FF26B3294FC9}" destId="{A070CBC2-14EC-4A9F-9BE4-EBF7326E1714}" srcOrd="1" destOrd="0" presId="urn:microsoft.com/office/officeart/2005/8/layout/orgChart1"/>
-    <dgm:cxn modelId="{9D232075-A328-4910-A62D-DC43DBAA4649}" type="presOf" srcId="{04A08845-3B72-4FB6-A4E7-88CC653CE0BA}" destId="{878E4F0B-3E20-4424-94B0-EBBA8BFE388B}" srcOrd="0" destOrd="0" presId="urn:microsoft.com/office/officeart/2005/8/layout/orgChart1"/>
     <dgm:cxn modelId="{DE15B755-56BC-4249-A559-774D1A920925}" type="presOf" srcId="{B46B4196-7934-41C3-A7CC-93294C24D967}" destId="{9CB5ECF4-EE43-4B72-88EF-67DE06ABB8A3}" srcOrd="0" destOrd="0" presId="urn:microsoft.com/office/officeart/2005/8/layout/orgChart1"/>
-    <dgm:cxn modelId="{57B04A57-E618-48B9-A65F-581F97B4418C}" type="presOf" srcId="{41DF25B2-994D-4B96-8D73-B7E011D8EB1D}" destId="{CA1F7424-3DD7-40E9-825C-9CAEA377D9AC}" srcOrd="0" destOrd="0" presId="urn:microsoft.com/office/officeart/2005/8/layout/orgChart1"/>
-    <dgm:cxn modelId="{0362E783-5645-40EA-BE98-CDE6A4B3C789}" type="presOf" srcId="{CCC285BE-27F8-4B7A-B0FD-AB6D18E8533E}" destId="{CC1418D4-4CBD-4B61-BC61-6226E3116DFA}" srcOrd="0" destOrd="0" presId="urn:microsoft.com/office/officeart/2005/8/layout/orgChart1"/>
-    <dgm:cxn modelId="{97AC968A-F990-4E6C-B89C-947C247AA2B0}" type="presOf" srcId="{2E2E0F0D-6F36-495E-8C35-5785AB56C97B}" destId="{E6241A6E-F506-435F-9669-5DC1EC405E8C}" srcOrd="1" destOrd="0" presId="urn:microsoft.com/office/officeart/2005/8/layout/orgChart1"/>
-    <dgm:cxn modelId="{BC2B2D8C-A17C-47C5-B3D6-B7883D888AB6}" type="presOf" srcId="{1BB7AF13-049E-40F7-9CAB-479748FAB7FF}" destId="{DA39AD2B-53B1-4B12-8665-AF4B29F307FB}" srcOrd="0" destOrd="0" presId="urn:microsoft.com/office/officeart/2005/8/layout/orgChart1"/>
-    <dgm:cxn modelId="{3E228E8D-AF5E-473B-95CA-C9B613692143}" type="presOf" srcId="{B819F912-2C67-49A8-AF17-049A88347123}" destId="{294FF083-72AC-4592-9D4B-A62942A4F058}" srcOrd="0" destOrd="0" presId="urn:microsoft.com/office/officeart/2005/8/layout/orgChart1"/>
+    <dgm:cxn modelId="{4760B27A-CEF3-483C-A13E-E315E4148E9F}" type="presOf" srcId="{B34EED1C-6736-4F18-9AA1-623DDBF44A8C}" destId="{06A4B5E5-63F5-4D43-85F9-A5086BC312FD}" srcOrd="0" destOrd="0" presId="urn:microsoft.com/office/officeart/2005/8/layout/orgChart1"/>
+    <dgm:cxn modelId="{E89A317B-FB9C-4631-AE5C-9D693DA6D89E}" type="presOf" srcId="{B130D577-C181-4F6D-AC09-CE1C38DA9C8D}" destId="{6B947019-3E19-4EA0-BC88-C55D27554B62}" srcOrd="1" destOrd="0" presId="urn:microsoft.com/office/officeart/2005/8/layout/orgChart1"/>
+    <dgm:cxn modelId="{CC09237D-FBD7-46A5-83AF-3DB54CA70EB9}" type="presOf" srcId="{D4E665BE-7CF3-4DBE-83B8-A866A5CD835F}" destId="{892BD28F-03E1-4D71-AD0F-AAFD29BCD7DF}" srcOrd="0" destOrd="0" presId="urn:microsoft.com/office/officeart/2005/8/layout/orgChart1"/>
+    <dgm:cxn modelId="{152CFE80-1FA1-4758-A10D-2CCC80BCA096}" type="presOf" srcId="{06FC4B56-33C3-42C2-B905-FF26B3294FC9}" destId="{A070CBC2-14EC-4A9F-9BE4-EBF7326E1714}" srcOrd="1" destOrd="0" presId="urn:microsoft.com/office/officeart/2005/8/layout/orgChart1"/>
     <dgm:cxn modelId="{54ECF68F-88C4-4C61-81B5-0C04284BAEF7}" srcId="{64DB1CB9-4310-4DB0-A170-C70424FA7C9A}" destId="{7BC84D3C-6D3F-4F65-AAFB-6664EF76B498}" srcOrd="0" destOrd="0" parTransId="{57BE7836-9774-49AD-94F2-61714910FB11}" sibTransId="{31A0432D-D572-40C0-97CB-6282AD1E35C1}"/>
+    <dgm:cxn modelId="{BDACD291-77C2-4EA7-BE4E-FD8183839CC6}" type="presOf" srcId="{751469AB-D165-4EC6-BBD9-892C3B2FAC33}" destId="{FAF85B28-4734-4887-8AB6-0CD918DD9BD7}" srcOrd="1" destOrd="0" presId="urn:microsoft.com/office/officeart/2005/8/layout/orgChart1"/>
     <dgm:cxn modelId="{C3C2E893-6A2F-44B4-B679-E5ADB4608022}" type="presOf" srcId="{8953BB72-D521-4DFE-9EFF-AECF2A87B7A1}" destId="{7CE26E70-43CC-49EB-BAFD-D003BAD345E9}" srcOrd="1" destOrd="0" presId="urn:microsoft.com/office/officeart/2005/8/layout/orgChart1"/>
-    <dgm:cxn modelId="{8D02A897-2F1F-4AC0-9848-F9A786512134}" type="presOf" srcId="{751469AB-D165-4EC6-BBD9-892C3B2FAC33}" destId="{FAF85B28-4734-4887-8AB6-0CD918DD9BD7}" srcOrd="1" destOrd="0" presId="urn:microsoft.com/office/officeart/2005/8/layout/orgChart1"/>
+    <dgm:cxn modelId="{0FEC3D94-DA54-4A3F-B01F-1FB5FA561054}" type="presOf" srcId="{1BB7AF13-049E-40F7-9CAB-479748FAB7FF}" destId="{DA39AD2B-53B1-4B12-8665-AF4B29F307FB}" srcOrd="0" destOrd="0" presId="urn:microsoft.com/office/officeart/2005/8/layout/orgChart1"/>
+    <dgm:cxn modelId="{DB594096-5A0F-47D1-9501-A21AB77068D7}" type="presOf" srcId="{2E2E0F0D-6F36-495E-8C35-5785AB56C97B}" destId="{E6241A6E-F506-435F-9669-5DC1EC405E8C}" srcOrd="1" destOrd="0" presId="urn:microsoft.com/office/officeart/2005/8/layout/orgChart1"/>
+    <dgm:cxn modelId="{6F712999-3EE4-4D79-B088-AB7A487865BE}" type="presOf" srcId="{FB4A4402-DBB8-42C2-9236-AA7DFDF231E7}" destId="{C5557B50-17AD-4498-992D-799031EA5B37}" srcOrd="0" destOrd="0" presId="urn:microsoft.com/office/officeart/2005/8/layout/orgChart1"/>
     <dgm:cxn modelId="{1C2F2F9B-4489-4561-A7A6-967A5DCF9860}" type="presOf" srcId="{2F864E52-8A4E-4173-8EFD-0EAE88274AC0}" destId="{6BAD6C85-AEA6-421B-A9C9-082FF217BAC3}" srcOrd="0" destOrd="0" presId="urn:microsoft.com/office/officeart/2005/8/layout/orgChart1"/>
-    <dgm:cxn modelId="{B81D4E9D-D2BA-40EE-BE57-C7D6ABDB7352}" type="presOf" srcId="{4A766C71-EB23-4D95-B9F6-6C660C3ECD8B}" destId="{5338CB64-B33A-4BED-ACE3-6D3BF3602705}" srcOrd="0" destOrd="0" presId="urn:microsoft.com/office/officeart/2005/8/layout/orgChart1"/>
     <dgm:cxn modelId="{41B5F09D-8B63-427B-A1E7-0DB0ADE8AC6D}" type="presOf" srcId="{7BC84D3C-6D3F-4F65-AAFB-6664EF76B498}" destId="{628003FC-A588-4D9A-8E7D-C06839C595DC}" srcOrd="1" destOrd="0" presId="urn:microsoft.com/office/officeart/2005/8/layout/orgChart1"/>
     <dgm:cxn modelId="{E3E43DA4-47CF-489D-A120-1205F9D36EC5}" srcId="{7BC84D3C-6D3F-4F65-AAFB-6664EF76B498}" destId="{CCC285BE-27F8-4B7A-B0FD-AB6D18E8533E}" srcOrd="1" destOrd="0" parTransId="{E7BF0574-D4DB-494C-B6E3-F31072AB75C3}" sibTransId="{653E0B8A-F4CC-4D13-AAD1-27FE41C314B0}"/>
     <dgm:cxn modelId="{288882A6-0A91-49B6-A953-FEAEDD854566}" srcId="{7BC84D3C-6D3F-4F65-AAFB-6664EF76B498}" destId="{41DF25B2-994D-4B96-8D73-B7E011D8EB1D}" srcOrd="0" destOrd="0" parTransId="{4B70991C-9634-406E-A7F6-6FE37412B701}" sibTransId="{65B7A998-45B0-459E-8611-02CDC9B0B4D0}"/>
     <dgm:cxn modelId="{408888AC-CAAC-4A6E-A6E9-05FCBB0628F0}" srcId="{41DF25B2-994D-4B96-8D73-B7E011D8EB1D}" destId="{06FC4B56-33C3-42C2-B905-FF26B3294FC9}" srcOrd="0" destOrd="0" parTransId="{F1880794-B573-4CF8-A971-5303D10CDBAC}" sibTransId="{CACEC8A1-A853-4B05-9B13-DB4A998E22D1}"/>
+    <dgm:cxn modelId="{D16A35B1-6DBB-43A2-B5C5-C097368E97E5}" type="presOf" srcId="{B130D577-C181-4F6D-AC09-CE1C38DA9C8D}" destId="{C4412BE2-ECCF-406E-AA8E-B74753721C46}" srcOrd="0" destOrd="0" presId="urn:microsoft.com/office/officeart/2005/8/layout/orgChart1"/>
     <dgm:cxn modelId="{EBDEEAB6-0E88-4528-A394-238C3B011133}" srcId="{2E2E0F0D-6F36-495E-8C35-5785AB56C97B}" destId="{D4E665BE-7CF3-4DBE-83B8-A866A5CD835F}" srcOrd="0" destOrd="0" parTransId="{1BB7AF13-049E-40F7-9CAB-479748FAB7FF}" sibTransId="{B151C9E3-E633-4891-9AB0-A942E93D0228}"/>
-    <dgm:cxn modelId="{E88E53B7-8C40-4A13-8D85-DAB15EA75F3A}" type="presOf" srcId="{BECE908C-165B-47F8-AD3F-F48300269308}" destId="{2E89FA2F-74F9-4765-B9E3-98D7DBD656AC}" srcOrd="0" destOrd="0" presId="urn:microsoft.com/office/officeart/2005/8/layout/orgChart1"/>
-    <dgm:cxn modelId="{BEDDAEBC-30AF-4713-8FD4-449ED172CD3B}" type="presOf" srcId="{E7BF0574-D4DB-494C-B6E3-F31072AB75C3}" destId="{D3B7F450-9734-4EE7-9DDB-0C063BC7283C}" srcOrd="0" destOrd="0" presId="urn:microsoft.com/office/officeart/2005/8/layout/orgChart1"/>
+    <dgm:cxn modelId="{C27464BB-4859-4849-9007-59BF57FAC029}" type="presOf" srcId="{A21E556F-24FD-4FC3-BA48-3C6D6250622E}" destId="{FBBEC861-BB57-4C30-A72B-B31BC72F3720}" srcOrd="0" destOrd="0" presId="urn:microsoft.com/office/officeart/2005/8/layout/orgChart1"/>
+    <dgm:cxn modelId="{D6E878BE-72A4-4795-BC07-D6D30B093FBF}" type="presOf" srcId="{650C4E55-868E-4B6E-8F6C-70827A912773}" destId="{6BD62762-A74B-4D5D-8EDB-0897C75ADE82}" srcOrd="0" destOrd="0" presId="urn:microsoft.com/office/officeart/2005/8/layout/orgChart1"/>
+    <dgm:cxn modelId="{2AA999C4-551C-4F8F-B951-65193DC3A05A}" type="presOf" srcId="{751469AB-D165-4EC6-BBD9-892C3B2FAC33}" destId="{90C65C7C-388A-4FF7-9C94-918F2FEAB691}" srcOrd="0" destOrd="0" presId="urn:microsoft.com/office/officeart/2005/8/layout/orgChart1"/>
     <dgm:cxn modelId="{EDFD48C8-7237-42AE-87B4-206925CE99F7}" type="presOf" srcId="{97FFE5E7-651C-49D0-BD06-55501B8B4DB1}" destId="{4BCD16C6-25C9-4770-AD84-F75FC7CEE244}" srcOrd="0" destOrd="0" presId="urn:microsoft.com/office/officeart/2005/8/layout/orgChart1"/>
+    <dgm:cxn modelId="{158DDCCA-79C9-4E19-A4F4-72BB75C3BF0B}" type="presOf" srcId="{2E2E0F0D-6F36-495E-8C35-5785AB56C97B}" destId="{C668CE75-5F45-4F07-8A39-54FF0948F513}" srcOrd="0" destOrd="0" presId="urn:microsoft.com/office/officeart/2005/8/layout/orgChart1"/>
     <dgm:cxn modelId="{98A6DCCB-0F74-4441-91FA-ABBCD642AD3F}" srcId="{E27618FA-829E-4A6B-911F-8A52EBF04BF5}" destId="{BECE908C-165B-47F8-AD3F-F48300269308}" srcOrd="0" destOrd="0" parTransId="{04A08845-3B72-4FB6-A4E7-88CC653CE0BA}" sibTransId="{641BE3D2-FC52-4009-AA7C-8D3BC43DF44A}"/>
-    <dgm:cxn modelId="{CB295ECD-B647-4F88-B969-3C4C2F3721AF}" type="presOf" srcId="{41DF25B2-994D-4B96-8D73-B7E011D8EB1D}" destId="{2D41F315-25F7-4D8E-89CC-DBED89BD673A}" srcOrd="1" destOrd="0" presId="urn:microsoft.com/office/officeart/2005/8/layout/orgChart1"/>
+    <dgm:cxn modelId="{3C362CCD-CFF5-446D-83C8-9C67D00E47EF}" srcId="{7BC84D3C-6D3F-4F65-AAFB-6664EF76B498}" destId="{988AE5C6-DDD5-41AF-873F-CDFD8490291D}" srcOrd="3" destOrd="0" parTransId="{650C4E55-868E-4B6E-8F6C-70827A912773}" sibTransId="{9FAD5322-A187-43AB-81C2-6B83783C7D24}"/>
     <dgm:cxn modelId="{19B8D4D6-4E05-431A-851F-B99215AD3280}" type="presOf" srcId="{D08377C1-26E2-421B-9A90-3FFE9FC10408}" destId="{CFB12294-E7D1-4516-955D-80C81F04EDDE}" srcOrd="0" destOrd="0" presId="urn:microsoft.com/office/officeart/2005/8/layout/orgChart1"/>
     <dgm:cxn modelId="{D7AEB0D8-722C-4734-A883-1CE89A61EE8A}" type="presOf" srcId="{2F864E52-8A4E-4173-8EFD-0EAE88274AC0}" destId="{821D2609-AF75-4CCB-8B78-627177565257}" srcOrd="1" destOrd="0" presId="urn:microsoft.com/office/officeart/2005/8/layout/orgChart1"/>
+    <dgm:cxn modelId="{A73820D9-AA61-480B-BC88-75D70D140AA4}" type="presOf" srcId="{BECE908C-165B-47F8-AD3F-F48300269308}" destId="{2E89FA2F-74F9-4765-B9E3-98D7DBD656AC}" srcOrd="0" destOrd="0" presId="urn:microsoft.com/office/officeart/2005/8/layout/orgChart1"/>
+    <dgm:cxn modelId="{A2BF45DA-9803-4BEE-8A37-1CCAB176618F}" type="presOf" srcId="{988AE5C6-DDD5-41AF-873F-CDFD8490291D}" destId="{95818E8C-F0F7-42E9-8C3D-12C643641ED5}" srcOrd="0" destOrd="0" presId="urn:microsoft.com/office/officeart/2005/8/layout/orgChart1"/>
     <dgm:cxn modelId="{7E0315DD-3B1B-4903-9F3E-E0657DA71622}" srcId="{64DB1CB9-4310-4DB0-A170-C70424FA7C9A}" destId="{8953BB72-D521-4DFE-9EFF-AECF2A87B7A1}" srcOrd="1" destOrd="0" parTransId="{A49AD552-C766-4785-9D99-F86353047DB5}" sibTransId="{B636BA23-7D3B-4BF6-BB51-F7596DCA6A68}"/>
     <dgm:cxn modelId="{807557DD-9A45-45EC-BE7B-B48FD10142F7}" srcId="{B46B4196-7934-41C3-A7CC-93294C24D967}" destId="{15498E2D-CDEC-46E9-B130-3CDD51EB90EB}" srcOrd="0" destOrd="0" parTransId="{F96DF90F-F99F-474F-B7BB-655F2930D89C}" sibTransId="{77E0F4DA-032B-4C7A-9036-DE47E78681FB}"/>
-    <dgm:cxn modelId="{527DCDDD-DBB9-40D9-BE7E-247E0A844C97}" type="presOf" srcId="{DB039CF0-B995-4962-A60F-DAF0FF97807C}" destId="{EF4DD7FF-F938-43A1-B5DD-E48D38FD6955}" srcOrd="0" destOrd="0" presId="urn:microsoft.com/office/officeart/2005/8/layout/orgChart1"/>
+    <dgm:cxn modelId="{5EEDC9DD-7868-496C-8B34-EA0818D2C174}" type="presOf" srcId="{41DF25B2-994D-4B96-8D73-B7E011D8EB1D}" destId="{2D41F315-25F7-4D8E-89CC-DBED89BD673A}" srcOrd="1" destOrd="0" presId="urn:microsoft.com/office/officeart/2005/8/layout/orgChart1"/>
     <dgm:cxn modelId="{BE50C5DE-8554-4061-8F29-70AB649F8282}" srcId="{83C88DCB-43CD-4934-9573-B7DE9060BB99}" destId="{2F864E52-8A4E-4173-8EFD-0EAE88274AC0}" srcOrd="0" destOrd="0" parTransId="{5DA2088A-4841-49BF-B858-8C3DF77AF483}" sibTransId="{7BB004CF-E277-486E-835D-8DD84631347E}"/>
     <dgm:cxn modelId="{C28597E0-A446-4C64-9DC8-25B70E162017}" type="presOf" srcId="{F96DF90F-F99F-474F-B7BB-655F2930D89C}" destId="{1847C212-F8F5-413A-B274-02434669DE4A}" srcOrd="0" destOrd="0" presId="urn:microsoft.com/office/officeart/2005/8/layout/orgChart1"/>
+    <dgm:cxn modelId="{A36CEBE0-17F0-4137-92A0-1001509C4E1C}" type="presOf" srcId="{BECE908C-165B-47F8-AD3F-F48300269308}" destId="{31F30900-8B02-4BC1-9D2C-C5565E43B67E}" srcOrd="1" destOrd="0" presId="urn:microsoft.com/office/officeart/2005/8/layout/orgChart1"/>
+    <dgm:cxn modelId="{62FB97E3-AC7F-46D2-A40D-C1FB3C2E0D25}" type="presOf" srcId="{E27618FA-829E-4A6B-911F-8A52EBF04BF5}" destId="{6ACF9E05-724A-416E-ABB4-CF8C47774BA8}" srcOrd="0" destOrd="0" presId="urn:microsoft.com/office/officeart/2005/8/layout/orgChart1"/>
     <dgm:cxn modelId="{5AD44AED-46DC-497A-A6C6-652C9311F7AA}" type="presOf" srcId="{8953BB72-D521-4DFE-9EFF-AECF2A87B7A1}" destId="{257BFB99-44CC-487D-A299-7181725AD144}" srcOrd="0" destOrd="0" presId="urn:microsoft.com/office/officeart/2005/8/layout/orgChart1"/>
-    <dgm:cxn modelId="{D6D08AF7-6EA4-4F3E-A583-2768AF87970B}" type="presOf" srcId="{F1880794-B573-4CF8-A971-5303D10CDBAC}" destId="{E26CD382-2A29-41E2-93C4-489A071E0606}" srcOrd="0" destOrd="0" presId="urn:microsoft.com/office/officeart/2005/8/layout/orgChart1"/>
     <dgm:cxn modelId="{13D69BF9-BBE9-44E9-B788-D31B78F07219}" srcId="{41DF25B2-994D-4B96-8D73-B7E011D8EB1D}" destId="{E27618FA-829E-4A6B-911F-8A52EBF04BF5}" srcOrd="1" destOrd="0" parTransId="{4A766C71-EB23-4D95-B9F6-6C660C3ECD8B}" sibTransId="{F4805018-8645-47FB-A25B-9D26116E5A9C}"/>
-    <dgm:cxn modelId="{5AD9A4F9-19CC-4311-92B5-1DD59E9D9F1F}" type="presOf" srcId="{FB4A4402-DBB8-42C2-9236-AA7DFDF231E7}" destId="{AA289500-C62E-4335-99F0-3B71A01D0175}" srcOrd="1" destOrd="0" presId="urn:microsoft.com/office/officeart/2005/8/layout/orgChart1"/>
-    <dgm:cxn modelId="{F2D813FD-399C-4036-BCFB-BD6F5F00B203}" type="presOf" srcId="{A21E556F-24FD-4FC3-BA48-3C6D6250622E}" destId="{FBBEC861-BB57-4C30-A72B-B31BC72F3720}" srcOrd="0" destOrd="0" presId="urn:microsoft.com/office/officeart/2005/8/layout/orgChart1"/>
+    <dgm:cxn modelId="{F58AD5F9-CB57-4400-8F3E-C4B1D3CCD434}" type="presOf" srcId="{CCC285BE-27F8-4B7A-B0FD-AB6D18E8533E}" destId="{CC1418D4-4CBD-4B61-BC61-6226E3116DFA}" srcOrd="0" destOrd="0" presId="urn:microsoft.com/office/officeart/2005/8/layout/orgChart1"/>
     <dgm:cxn modelId="{F7BDCEFF-088B-4482-BC10-7F5AB49F1557}" type="presOf" srcId="{64DB1CB9-4310-4DB0-A170-C70424FA7C9A}" destId="{8FF893B5-F116-47BD-BD0A-6292E77540BA}" srcOrd="0" destOrd="0" presId="urn:microsoft.com/office/officeart/2005/8/layout/orgChart1"/>
     <dgm:cxn modelId="{98FBFAC0-ED18-49BF-8F13-D40B5B301B22}" type="presParOf" srcId="{8FF893B5-F116-47BD-BD0A-6292E77540BA}" destId="{0FB25FAB-2169-4CB4-900D-BD99A5FABB34}" srcOrd="0" destOrd="0" presId="urn:microsoft.com/office/officeart/2005/8/layout/orgChart1"/>
     <dgm:cxn modelId="{67393F17-3F79-47AD-BC65-0FD344DB0CB7}" type="presParOf" srcId="{0FB25FAB-2169-4CB4-900D-BD99A5FABB34}" destId="{45F64D40-1861-4DBD-860B-851495F6F49F}" srcOrd="0" destOrd="0" presId="urn:microsoft.com/office/officeart/2005/8/layout/orgChart1"/>
     <dgm:cxn modelId="{52E3DDAA-182A-448A-80DA-FBCC7EA7DD33}" type="presParOf" srcId="{45F64D40-1861-4DBD-860B-851495F6F49F}" destId="{FA9804DD-40AB-4677-A1BC-173CBF1D1729}" srcOrd="0" destOrd="0" presId="urn:microsoft.com/office/officeart/2005/8/layout/orgChart1"/>
     <dgm:cxn modelId="{005A8DCB-F886-48EF-AA56-B0A2835F5DA2}" type="presParOf" srcId="{45F64D40-1861-4DBD-860B-851495F6F49F}" destId="{628003FC-A588-4D9A-8E7D-C06839C595DC}" srcOrd="1" destOrd="0" presId="urn:microsoft.com/office/officeart/2005/8/layout/orgChart1"/>
     <dgm:cxn modelId="{3F3DC288-77E1-44D1-8806-6F1C1E3EF595}" type="presParOf" srcId="{0FB25FAB-2169-4CB4-900D-BD99A5FABB34}" destId="{68BDC7A9-CDE9-4D27-8F92-DA459D6626D6}" srcOrd="1" destOrd="0" presId="urn:microsoft.com/office/officeart/2005/8/layout/orgChart1"/>
-    <dgm:cxn modelId="{3E353770-F881-428C-9ACA-98BE866528A9}" type="presParOf" srcId="{68BDC7A9-CDE9-4D27-8F92-DA459D6626D6}" destId="{177199FA-9F19-400E-A961-2B3AE2745D5F}" srcOrd="0" destOrd="0" presId="urn:microsoft.com/office/officeart/2005/8/layout/orgChart1"/>
-    <dgm:cxn modelId="{B3E53FAA-7785-4883-8716-CC227385CA28}" type="presParOf" srcId="{68BDC7A9-CDE9-4D27-8F92-DA459D6626D6}" destId="{35F06697-3895-4A49-865E-0857BC05BB58}" srcOrd="1" destOrd="0" presId="urn:microsoft.com/office/officeart/2005/8/layout/orgChart1"/>
-    <dgm:cxn modelId="{7F71FE67-7725-49A9-B123-A8F9D69A8151}" type="presParOf" srcId="{35F06697-3895-4A49-865E-0857BC05BB58}" destId="{127F23A4-99CF-460A-B41D-F9EFE32AEB1C}" srcOrd="0" destOrd="0" presId="urn:microsoft.com/office/officeart/2005/8/layout/orgChart1"/>
-    <dgm:cxn modelId="{9E331D33-43CE-4687-A91B-8FA1781AC025}" type="presParOf" srcId="{127F23A4-99CF-460A-B41D-F9EFE32AEB1C}" destId="{CA1F7424-3DD7-40E9-825C-9CAEA377D9AC}" srcOrd="0" destOrd="0" presId="urn:microsoft.com/office/officeart/2005/8/layout/orgChart1"/>
-    <dgm:cxn modelId="{CAE2FA47-BDA2-4659-A3E4-F3AC21386DE1}" type="presParOf" srcId="{127F23A4-99CF-460A-B41D-F9EFE32AEB1C}" destId="{2D41F315-25F7-4D8E-89CC-DBED89BD673A}" srcOrd="1" destOrd="0" presId="urn:microsoft.com/office/officeart/2005/8/layout/orgChart1"/>
-    <dgm:cxn modelId="{F8B5810B-7C04-4766-BFC3-455E9359CAB2}" type="presParOf" srcId="{35F06697-3895-4A49-865E-0857BC05BB58}" destId="{647756F6-1B21-49FD-B779-33C584EEA3AA}" srcOrd="1" destOrd="0" presId="urn:microsoft.com/office/officeart/2005/8/layout/orgChart1"/>
-    <dgm:cxn modelId="{757C0A0C-1CA8-41CE-9C2D-83F71CFB3828}" type="presParOf" srcId="{647756F6-1B21-49FD-B779-33C584EEA3AA}" destId="{E26CD382-2A29-41E2-93C4-489A071E0606}" srcOrd="0" destOrd="0" presId="urn:microsoft.com/office/officeart/2005/8/layout/orgChart1"/>
-    <dgm:cxn modelId="{A5A661A0-D8EF-44A5-8D13-13CF722D9463}" type="presParOf" srcId="{647756F6-1B21-49FD-B779-33C584EEA3AA}" destId="{B5C24A73-47ED-431F-A421-7E4723DB4C5E}" srcOrd="1" destOrd="0" presId="urn:microsoft.com/office/officeart/2005/8/layout/orgChart1"/>
-    <dgm:cxn modelId="{19438C8C-3367-4D6A-B31D-559613CF9736}" type="presParOf" srcId="{B5C24A73-47ED-431F-A421-7E4723DB4C5E}" destId="{7FFEFBAB-DFF3-4A76-9BAD-9BE5E650A4AD}" srcOrd="0" destOrd="0" presId="urn:microsoft.com/office/officeart/2005/8/layout/orgChart1"/>
-    <dgm:cxn modelId="{C31E1CD6-03A1-40F5-8F6A-09C593920D84}" type="presParOf" srcId="{7FFEFBAB-DFF3-4A76-9BAD-9BE5E650A4AD}" destId="{FFE19F79-B535-4863-B4C1-1FF8E2C5BB5C}" srcOrd="0" destOrd="0" presId="urn:microsoft.com/office/officeart/2005/8/layout/orgChart1"/>
-    <dgm:cxn modelId="{66B223B1-08A0-4DF4-BE51-C3856B0EF3C0}" type="presParOf" srcId="{7FFEFBAB-DFF3-4A76-9BAD-9BE5E650A4AD}" destId="{A070CBC2-14EC-4A9F-9BE4-EBF7326E1714}" srcOrd="1" destOrd="0" presId="urn:microsoft.com/office/officeart/2005/8/layout/orgChart1"/>
-    <dgm:cxn modelId="{9F6902DC-EEA3-4F5A-9561-B75376E9C331}" type="presParOf" srcId="{B5C24A73-47ED-431F-A421-7E4723DB4C5E}" destId="{A085BD18-B427-4EA4-BED8-8ABD637EF718}" srcOrd="1" destOrd="0" presId="urn:microsoft.com/office/officeart/2005/8/layout/orgChart1"/>
-    <dgm:cxn modelId="{AE2D1BFD-C84B-4271-890E-5F01DDF32DBA}" type="presParOf" srcId="{A085BD18-B427-4EA4-BED8-8ABD637EF718}" destId="{EF4DD7FF-F938-43A1-B5DD-E48D38FD6955}" srcOrd="0" destOrd="0" presId="urn:microsoft.com/office/officeart/2005/8/layout/orgChart1"/>
-    <dgm:cxn modelId="{9B5EACF0-81D0-45DB-8D35-F0B7750857A3}" type="presParOf" srcId="{A085BD18-B427-4EA4-BED8-8ABD637EF718}" destId="{B11B36A7-87A4-46E8-8862-96E69343A459}" srcOrd="1" destOrd="0" presId="urn:microsoft.com/office/officeart/2005/8/layout/orgChart1"/>
-    <dgm:cxn modelId="{17FD7AC1-02FA-46B5-9E6B-0AC3AAD959DA}" type="presParOf" srcId="{B11B36A7-87A4-46E8-8862-96E69343A459}" destId="{E5BA0EF9-47AB-42EA-B055-806F16C694CB}" srcOrd="0" destOrd="0" presId="urn:microsoft.com/office/officeart/2005/8/layout/orgChart1"/>
-    <dgm:cxn modelId="{EBF33577-1D8D-408C-80AC-3AFC5C98532C}" type="presParOf" srcId="{E5BA0EF9-47AB-42EA-B055-806F16C694CB}" destId="{C5557B50-17AD-4498-992D-799031EA5B37}" srcOrd="0" destOrd="0" presId="urn:microsoft.com/office/officeart/2005/8/layout/orgChart1"/>
-    <dgm:cxn modelId="{159CCDC9-4771-41A1-ACCB-B1BD402C103F}" type="presParOf" srcId="{E5BA0EF9-47AB-42EA-B055-806F16C694CB}" destId="{AA289500-C62E-4335-99F0-3B71A01D0175}" srcOrd="1" destOrd="0" presId="urn:microsoft.com/office/officeart/2005/8/layout/orgChart1"/>
-    <dgm:cxn modelId="{45E98FA6-0898-45D9-BCD1-E8E8FD5E1DEE}" type="presParOf" srcId="{B11B36A7-87A4-46E8-8862-96E69343A459}" destId="{C7BEDCC1-DC50-4778-998E-FE4DF25512C6}" srcOrd="1" destOrd="0" presId="urn:microsoft.com/office/officeart/2005/8/layout/orgChart1"/>
-    <dgm:cxn modelId="{0AD26414-5A09-47F1-97FD-3C912EDEC682}" type="presParOf" srcId="{B11B36A7-87A4-46E8-8862-96E69343A459}" destId="{FBC90197-2959-4D79-9F0F-7EC8CBFCB149}" srcOrd="2" destOrd="0" presId="urn:microsoft.com/office/officeart/2005/8/layout/orgChart1"/>
-    <dgm:cxn modelId="{09386D77-550A-4FCB-8385-DEA017EF630E}" type="presParOf" srcId="{B5C24A73-47ED-431F-A421-7E4723DB4C5E}" destId="{9ED8D5FB-FE41-482F-8C51-333235D774CF}" srcOrd="2" destOrd="0" presId="urn:microsoft.com/office/officeart/2005/8/layout/orgChart1"/>
-    <dgm:cxn modelId="{BD92B10F-CE9E-4B7E-9699-B367F3AD7AD6}" type="presParOf" srcId="{647756F6-1B21-49FD-B779-33C584EEA3AA}" destId="{5338CB64-B33A-4BED-ACE3-6D3BF3602705}" srcOrd="2" destOrd="0" presId="urn:microsoft.com/office/officeart/2005/8/layout/orgChart1"/>
-    <dgm:cxn modelId="{3363D844-E6C4-4CF3-8EC1-254FA9A6DCAF}" type="presParOf" srcId="{647756F6-1B21-49FD-B779-33C584EEA3AA}" destId="{F603711F-F085-4153-8C7E-9D35C7D15568}" srcOrd="3" destOrd="0" presId="urn:microsoft.com/office/officeart/2005/8/layout/orgChart1"/>
-    <dgm:cxn modelId="{2CBA3E25-C7B2-48BD-B21A-0B7403B0DDA5}" type="presParOf" srcId="{F603711F-F085-4153-8C7E-9D35C7D15568}" destId="{732CB1A2-9756-4564-A51D-2936BFECC690}" srcOrd="0" destOrd="0" presId="urn:microsoft.com/office/officeart/2005/8/layout/orgChart1"/>
-    <dgm:cxn modelId="{1266EADC-E7A7-445C-8FF7-19544B4281BD}" type="presParOf" srcId="{732CB1A2-9756-4564-A51D-2936BFECC690}" destId="{6ACF9E05-724A-416E-ABB4-CF8C47774BA8}" srcOrd="0" destOrd="0" presId="urn:microsoft.com/office/officeart/2005/8/layout/orgChart1"/>
-    <dgm:cxn modelId="{8725C338-FAFF-434D-95A6-8839854F996A}" type="presParOf" srcId="{732CB1A2-9756-4564-A51D-2936BFECC690}" destId="{AFCFFD40-0ACE-4B28-BA86-2A5868209EB7}" srcOrd="1" destOrd="0" presId="urn:microsoft.com/office/officeart/2005/8/layout/orgChart1"/>
-    <dgm:cxn modelId="{FEF5EDF7-7A05-441B-A178-93F18DE7DFDB}" type="presParOf" srcId="{F603711F-F085-4153-8C7E-9D35C7D15568}" destId="{AA2CBD5D-F35C-49D0-957E-9D0E3788D9A0}" srcOrd="1" destOrd="0" presId="urn:microsoft.com/office/officeart/2005/8/layout/orgChart1"/>
-    <dgm:cxn modelId="{F5D9870A-54D3-4C0C-94D9-02A455C0B65D}" type="presParOf" srcId="{AA2CBD5D-F35C-49D0-957E-9D0E3788D9A0}" destId="{878E4F0B-3E20-4424-94B0-EBBA8BFE388B}" srcOrd="0" destOrd="0" presId="urn:microsoft.com/office/officeart/2005/8/layout/orgChart1"/>
-    <dgm:cxn modelId="{EBDAB322-F8CC-4097-B61F-D353F2E24571}" type="presParOf" srcId="{AA2CBD5D-F35C-49D0-957E-9D0E3788D9A0}" destId="{A45CE1FA-A605-4B2F-9B5D-60D37B86B126}" srcOrd="1" destOrd="0" presId="urn:microsoft.com/office/officeart/2005/8/layout/orgChart1"/>
-    <dgm:cxn modelId="{55A57BC6-522B-42FA-8873-6E306B3BBAF7}" type="presParOf" srcId="{A45CE1FA-A605-4B2F-9B5D-60D37B86B126}" destId="{94A96030-0ABA-401B-B307-97A3086EEF85}" srcOrd="0" destOrd="0" presId="urn:microsoft.com/office/officeart/2005/8/layout/orgChart1"/>
-    <dgm:cxn modelId="{549037D7-4F41-4D91-9CE7-F441A6EACC13}" type="presParOf" srcId="{94A96030-0ABA-401B-B307-97A3086EEF85}" destId="{2E89FA2F-74F9-4765-B9E3-98D7DBD656AC}" srcOrd="0" destOrd="0" presId="urn:microsoft.com/office/officeart/2005/8/layout/orgChart1"/>
-    <dgm:cxn modelId="{364497AC-F613-44A7-9F30-10F3E762F6E8}" type="presParOf" srcId="{94A96030-0ABA-401B-B307-97A3086EEF85}" destId="{31F30900-8B02-4BC1-9D2C-C5565E43B67E}" srcOrd="1" destOrd="0" presId="urn:microsoft.com/office/officeart/2005/8/layout/orgChart1"/>
-    <dgm:cxn modelId="{1C8BB818-FF24-4A20-B124-92777E58DCD9}" type="presParOf" srcId="{A45CE1FA-A605-4B2F-9B5D-60D37B86B126}" destId="{6AC0227D-9A72-481B-8A15-EAB8F38C85D9}" srcOrd="1" destOrd="0" presId="urn:microsoft.com/office/officeart/2005/8/layout/orgChart1"/>
-    <dgm:cxn modelId="{98AD9379-C52F-4461-BDF6-067B0D3A48BB}" type="presParOf" srcId="{A45CE1FA-A605-4B2F-9B5D-60D37B86B126}" destId="{D20BD6BC-ACAC-4311-9910-00B67FD53BA4}" srcOrd="2" destOrd="0" presId="urn:microsoft.com/office/officeart/2005/8/layout/orgChart1"/>
-    <dgm:cxn modelId="{9C51D939-5CEB-4FD8-842C-3F96C1E59C15}" type="presParOf" srcId="{F603711F-F085-4153-8C7E-9D35C7D15568}" destId="{451AF950-68FA-4C9A-8BAD-28B016035091}" srcOrd="2" destOrd="0" presId="urn:microsoft.com/office/officeart/2005/8/layout/orgChart1"/>
-    <dgm:cxn modelId="{79C04B34-7381-406B-9812-B87AFC3A23F4}" type="presParOf" srcId="{35F06697-3895-4A49-865E-0857BC05BB58}" destId="{2BE215EB-CBBD-4653-8380-CBC3CA2ACE73}" srcOrd="2" destOrd="0" presId="urn:microsoft.com/office/officeart/2005/8/layout/orgChart1"/>
-    <dgm:cxn modelId="{11673DB3-1B83-46CE-B161-F05878D5D0F0}" type="presParOf" srcId="{68BDC7A9-CDE9-4D27-8F92-DA459D6626D6}" destId="{D3B7F450-9734-4EE7-9DDB-0C063BC7283C}" srcOrd="2" destOrd="0" presId="urn:microsoft.com/office/officeart/2005/8/layout/orgChart1"/>
-    <dgm:cxn modelId="{FDD80C1F-9189-4F13-B580-B27362F42D8B}" type="presParOf" srcId="{68BDC7A9-CDE9-4D27-8F92-DA459D6626D6}" destId="{829124B6-0FBD-4771-BAB5-85E660C4C0D5}" srcOrd="3" destOrd="0" presId="urn:microsoft.com/office/officeart/2005/8/layout/orgChart1"/>
-    <dgm:cxn modelId="{1CF73870-8CBE-45A0-9774-B45A12034782}" type="presParOf" srcId="{829124B6-0FBD-4771-BAB5-85E660C4C0D5}" destId="{FA6CBAB3-E22F-43EF-B25D-90B16CE138FE}" srcOrd="0" destOrd="0" presId="urn:microsoft.com/office/officeart/2005/8/layout/orgChart1"/>
-    <dgm:cxn modelId="{AB2A8D0F-8308-49F9-BC46-F9F6951A7651}" type="presParOf" srcId="{FA6CBAB3-E22F-43EF-B25D-90B16CE138FE}" destId="{CC1418D4-4CBD-4B61-BC61-6226E3116DFA}" srcOrd="0" destOrd="0" presId="urn:microsoft.com/office/officeart/2005/8/layout/orgChart1"/>
-    <dgm:cxn modelId="{AAD68431-3DFA-4A15-9D83-036CBBBC3774}" type="presParOf" srcId="{FA6CBAB3-E22F-43EF-B25D-90B16CE138FE}" destId="{A04518F5-A788-4643-A8DF-898FAB6D3F7B}" srcOrd="1" destOrd="0" presId="urn:microsoft.com/office/officeart/2005/8/layout/orgChart1"/>
-    <dgm:cxn modelId="{EFB3915E-E1A6-4224-85F6-807CBA0EB0A4}" type="presParOf" srcId="{829124B6-0FBD-4771-BAB5-85E660C4C0D5}" destId="{22582729-D103-4810-92E0-ACF46AA961CE}" srcOrd="1" destOrd="0" presId="urn:microsoft.com/office/officeart/2005/8/layout/orgChart1"/>
-    <dgm:cxn modelId="{592D64AC-F488-4BB2-BA05-C682666419EB}" type="presParOf" srcId="{22582729-D103-4810-92E0-ACF46AA961CE}" destId="{FBBEC861-BB57-4C30-A72B-B31BC72F3720}" srcOrd="0" destOrd="0" presId="urn:microsoft.com/office/officeart/2005/8/layout/orgChart1"/>
-    <dgm:cxn modelId="{A5693038-661A-4CC1-9866-D2A61E644EDB}" type="presParOf" srcId="{22582729-D103-4810-92E0-ACF46AA961CE}" destId="{5539B797-FF9B-43E5-A154-4D3E1A94808C}" srcOrd="1" destOrd="0" presId="urn:microsoft.com/office/officeart/2005/8/layout/orgChart1"/>
-    <dgm:cxn modelId="{C5C92C80-1B8F-43E6-89A5-DBAA4AE8A0D4}" type="presParOf" srcId="{5539B797-FF9B-43E5-A154-4D3E1A94808C}" destId="{1D0AC80E-77BA-407C-AB4E-501C4EAF1CB7}" srcOrd="0" destOrd="0" presId="urn:microsoft.com/office/officeart/2005/8/layout/orgChart1"/>
-    <dgm:cxn modelId="{2D6B0382-4A69-4245-A39E-2AE3BD808BBD}" type="presParOf" srcId="{1D0AC80E-77BA-407C-AB4E-501C4EAF1CB7}" destId="{90C65C7C-388A-4FF7-9C94-918F2FEAB691}" srcOrd="0" destOrd="0" presId="urn:microsoft.com/office/officeart/2005/8/layout/orgChart1"/>
-    <dgm:cxn modelId="{DB62F0D5-2F56-4815-AA1F-1E4DAB7C1DBD}" type="presParOf" srcId="{1D0AC80E-77BA-407C-AB4E-501C4EAF1CB7}" destId="{FAF85B28-4734-4887-8AB6-0CD918DD9BD7}" srcOrd="1" destOrd="0" presId="urn:microsoft.com/office/officeart/2005/8/layout/orgChart1"/>
-    <dgm:cxn modelId="{8557306C-5C4A-439D-A8D4-B1E37102C0BC}" type="presParOf" srcId="{5539B797-FF9B-43E5-A154-4D3E1A94808C}" destId="{38A9DA92-07C3-447C-9264-AA29473CD6ED}" srcOrd="1" destOrd="0" presId="urn:microsoft.com/office/officeart/2005/8/layout/orgChart1"/>
-    <dgm:cxn modelId="{5940AD22-E046-44CC-BD89-528FAF2BA67E}" type="presParOf" srcId="{5539B797-FF9B-43E5-A154-4D3E1A94808C}" destId="{1FD28280-2159-4F33-A9C5-BD9ACBB49A63}" srcOrd="2" destOrd="0" presId="urn:microsoft.com/office/officeart/2005/8/layout/orgChart1"/>
-    <dgm:cxn modelId="{8497ADED-AEDC-4692-97E1-6417911A93F7}" type="presParOf" srcId="{829124B6-0FBD-4771-BAB5-85E660C4C0D5}" destId="{BC6F35A4-E1D7-4292-B68F-361EA63E4C5E}" srcOrd="2" destOrd="0" presId="urn:microsoft.com/office/officeart/2005/8/layout/orgChart1"/>
-    <dgm:cxn modelId="{50ED8A1A-ED6E-4ADC-A0B9-D2A582C57175}" type="presParOf" srcId="{68BDC7A9-CDE9-4D27-8F92-DA459D6626D6}" destId="{294FF083-72AC-4592-9D4B-A62942A4F058}" srcOrd="4" destOrd="0" presId="urn:microsoft.com/office/officeart/2005/8/layout/orgChart1"/>
-    <dgm:cxn modelId="{FD0AE04A-D68A-4DCC-9AB9-CD00D7479D8D}" type="presParOf" srcId="{68BDC7A9-CDE9-4D27-8F92-DA459D6626D6}" destId="{A913C26F-99E0-4572-98FB-1E0FE3A2E522}" srcOrd="5" destOrd="0" presId="urn:microsoft.com/office/officeart/2005/8/layout/orgChart1"/>
-    <dgm:cxn modelId="{0C7CBE54-1C72-47DF-BDED-FCB3FDCFD09C}" type="presParOf" srcId="{A913C26F-99E0-4572-98FB-1E0FE3A2E522}" destId="{57D9D258-0C1F-472F-AEAD-C3C7FDEA1593}" srcOrd="0" destOrd="0" presId="urn:microsoft.com/office/officeart/2005/8/layout/orgChart1"/>
-    <dgm:cxn modelId="{233EBFA9-B55E-4B67-90B9-F65592E60320}" type="presParOf" srcId="{57D9D258-0C1F-472F-AEAD-C3C7FDEA1593}" destId="{C668CE75-5F45-4F07-8A39-54FF0948F513}" srcOrd="0" destOrd="0" presId="urn:microsoft.com/office/officeart/2005/8/layout/orgChart1"/>
-    <dgm:cxn modelId="{141691E7-8424-41A4-B5E2-3FF9B9E5871B}" type="presParOf" srcId="{57D9D258-0C1F-472F-AEAD-C3C7FDEA1593}" destId="{E6241A6E-F506-435F-9669-5DC1EC405E8C}" srcOrd="1" destOrd="0" presId="urn:microsoft.com/office/officeart/2005/8/layout/orgChart1"/>
-    <dgm:cxn modelId="{D02F37F7-CAAD-4846-B778-0432A2EC39B7}" type="presParOf" srcId="{A913C26F-99E0-4572-98FB-1E0FE3A2E522}" destId="{36C55FAD-2914-4BDA-AE24-C7F45E0039C2}" srcOrd="1" destOrd="0" presId="urn:microsoft.com/office/officeart/2005/8/layout/orgChart1"/>
-    <dgm:cxn modelId="{2E428040-1BEC-41CB-AE1F-7EB58FE7B753}" type="presParOf" srcId="{36C55FAD-2914-4BDA-AE24-C7F45E0039C2}" destId="{DA39AD2B-53B1-4B12-8665-AF4B29F307FB}" srcOrd="0" destOrd="0" presId="urn:microsoft.com/office/officeart/2005/8/layout/orgChart1"/>
-    <dgm:cxn modelId="{84F78A9D-0D75-4D12-9B68-BD1A9F31C753}" type="presParOf" srcId="{36C55FAD-2914-4BDA-AE24-C7F45E0039C2}" destId="{253DE851-C592-45C8-9AE6-63554E5B2B74}" srcOrd="1" destOrd="0" presId="urn:microsoft.com/office/officeart/2005/8/layout/orgChart1"/>
-    <dgm:cxn modelId="{6AAA042A-24D9-41F8-98F4-E537B6056A9E}" type="presParOf" srcId="{253DE851-C592-45C8-9AE6-63554E5B2B74}" destId="{622E3F3A-9D91-44EC-B162-43A734B36CCB}" srcOrd="0" destOrd="0" presId="urn:microsoft.com/office/officeart/2005/8/layout/orgChart1"/>
-    <dgm:cxn modelId="{BB2A4984-2388-4C45-BDEC-6A985EB23A48}" type="presParOf" srcId="{622E3F3A-9D91-44EC-B162-43A734B36CCB}" destId="{892BD28F-03E1-4D71-AD0F-AAFD29BCD7DF}" srcOrd="0" destOrd="0" presId="urn:microsoft.com/office/officeart/2005/8/layout/orgChart1"/>
-    <dgm:cxn modelId="{9217835E-9CCE-4043-9024-FDD6F85C19DB}" type="presParOf" srcId="{622E3F3A-9D91-44EC-B162-43A734B36CCB}" destId="{396C34AD-EEFC-4B1C-84BC-869F399E8ED9}" srcOrd="1" destOrd="0" presId="urn:microsoft.com/office/officeart/2005/8/layout/orgChart1"/>
-    <dgm:cxn modelId="{EB9B3FFE-BD07-4D78-84A0-F6EA1E2F4778}" type="presParOf" srcId="{253DE851-C592-45C8-9AE6-63554E5B2B74}" destId="{D6126C01-FB41-4768-A124-366EF1936F7C}" srcOrd="1" destOrd="0" presId="urn:microsoft.com/office/officeart/2005/8/layout/orgChart1"/>
-    <dgm:cxn modelId="{61BAEA50-2B2E-4BBE-9293-5D4613A18AB6}" type="presParOf" srcId="{253DE851-C592-45C8-9AE6-63554E5B2B74}" destId="{9C624EB5-7A36-43BF-A9F0-C37C8C8CBFD4}" srcOrd="2" destOrd="0" presId="urn:microsoft.com/office/officeart/2005/8/layout/orgChart1"/>
-    <dgm:cxn modelId="{0147F4BC-1DB0-4392-82D0-1B26E2594CCD}" type="presParOf" srcId="{A913C26F-99E0-4572-98FB-1E0FE3A2E522}" destId="{231136D4-1B73-4DA2-B7CD-D91A16F99FE6}" srcOrd="2" destOrd="0" presId="urn:microsoft.com/office/officeart/2005/8/layout/orgChart1"/>
+    <dgm:cxn modelId="{035A2359-4B72-4804-9F44-98AACEF2CA22}" type="presParOf" srcId="{68BDC7A9-CDE9-4D27-8F92-DA459D6626D6}" destId="{177199FA-9F19-400E-A961-2B3AE2745D5F}" srcOrd="0" destOrd="0" presId="urn:microsoft.com/office/officeart/2005/8/layout/orgChart1"/>
+    <dgm:cxn modelId="{202D47C9-0C4C-422E-9832-684214666B59}" type="presParOf" srcId="{68BDC7A9-CDE9-4D27-8F92-DA459D6626D6}" destId="{35F06697-3895-4A49-865E-0857BC05BB58}" srcOrd="1" destOrd="0" presId="urn:microsoft.com/office/officeart/2005/8/layout/orgChart1"/>
+    <dgm:cxn modelId="{2F8D7CE8-A475-4C69-93D4-36891C4A8031}" type="presParOf" srcId="{35F06697-3895-4A49-865E-0857BC05BB58}" destId="{127F23A4-99CF-460A-B41D-F9EFE32AEB1C}" srcOrd="0" destOrd="0" presId="urn:microsoft.com/office/officeart/2005/8/layout/orgChart1"/>
+    <dgm:cxn modelId="{672378A5-86F2-4097-AFC3-E7096919DF34}" type="presParOf" srcId="{127F23A4-99CF-460A-B41D-F9EFE32AEB1C}" destId="{CA1F7424-3DD7-40E9-825C-9CAEA377D9AC}" srcOrd="0" destOrd="0" presId="urn:microsoft.com/office/officeart/2005/8/layout/orgChart1"/>
+    <dgm:cxn modelId="{50EB7E0E-A28C-469A-AFC0-5E8A01D90593}" type="presParOf" srcId="{127F23A4-99CF-460A-B41D-F9EFE32AEB1C}" destId="{2D41F315-25F7-4D8E-89CC-DBED89BD673A}" srcOrd="1" destOrd="0" presId="urn:microsoft.com/office/officeart/2005/8/layout/orgChart1"/>
+    <dgm:cxn modelId="{B385362E-FFBA-43D3-AC3E-D91D9E402183}" type="presParOf" srcId="{35F06697-3895-4A49-865E-0857BC05BB58}" destId="{647756F6-1B21-49FD-B779-33C584EEA3AA}" srcOrd="1" destOrd="0" presId="urn:microsoft.com/office/officeart/2005/8/layout/orgChart1"/>
+    <dgm:cxn modelId="{C6BCD8EE-0D90-4668-B254-B0F2D908119B}" type="presParOf" srcId="{647756F6-1B21-49FD-B779-33C584EEA3AA}" destId="{E26CD382-2A29-41E2-93C4-489A071E0606}" srcOrd="0" destOrd="0" presId="urn:microsoft.com/office/officeart/2005/8/layout/orgChart1"/>
+    <dgm:cxn modelId="{050DB284-FF9A-4460-AE1B-A1AB9BD31FD4}" type="presParOf" srcId="{647756F6-1B21-49FD-B779-33C584EEA3AA}" destId="{B5C24A73-47ED-431F-A421-7E4723DB4C5E}" srcOrd="1" destOrd="0" presId="urn:microsoft.com/office/officeart/2005/8/layout/orgChart1"/>
+    <dgm:cxn modelId="{CEA775E5-DE28-4566-8E52-110B584B5821}" type="presParOf" srcId="{B5C24A73-47ED-431F-A421-7E4723DB4C5E}" destId="{7FFEFBAB-DFF3-4A76-9BAD-9BE5E650A4AD}" srcOrd="0" destOrd="0" presId="urn:microsoft.com/office/officeart/2005/8/layout/orgChart1"/>
+    <dgm:cxn modelId="{3AC3D2CC-CC7D-49DC-8FE5-500444A6065D}" type="presParOf" srcId="{7FFEFBAB-DFF3-4A76-9BAD-9BE5E650A4AD}" destId="{FFE19F79-B535-4863-B4C1-1FF8E2C5BB5C}" srcOrd="0" destOrd="0" presId="urn:microsoft.com/office/officeart/2005/8/layout/orgChart1"/>
+    <dgm:cxn modelId="{E8D767D3-5AE3-4125-AD7E-23A52B8358CD}" type="presParOf" srcId="{7FFEFBAB-DFF3-4A76-9BAD-9BE5E650A4AD}" destId="{A070CBC2-14EC-4A9F-9BE4-EBF7326E1714}" srcOrd="1" destOrd="0" presId="urn:microsoft.com/office/officeart/2005/8/layout/orgChart1"/>
+    <dgm:cxn modelId="{EE4F9C9A-2F35-46AD-8523-48C0261668FC}" type="presParOf" srcId="{B5C24A73-47ED-431F-A421-7E4723DB4C5E}" destId="{A085BD18-B427-4EA4-BED8-8ABD637EF718}" srcOrd="1" destOrd="0" presId="urn:microsoft.com/office/officeart/2005/8/layout/orgChart1"/>
+    <dgm:cxn modelId="{A6E5114A-1C43-4709-B776-0A4E4FC331FA}" type="presParOf" srcId="{A085BD18-B427-4EA4-BED8-8ABD637EF718}" destId="{EF4DD7FF-F938-43A1-B5DD-E48D38FD6955}" srcOrd="0" destOrd="0" presId="urn:microsoft.com/office/officeart/2005/8/layout/orgChart1"/>
+    <dgm:cxn modelId="{9F5F98BD-3DCD-4A96-9A1F-6E0EA3F71E29}" type="presParOf" srcId="{A085BD18-B427-4EA4-BED8-8ABD637EF718}" destId="{B11B36A7-87A4-46E8-8862-96E69343A459}" srcOrd="1" destOrd="0" presId="urn:microsoft.com/office/officeart/2005/8/layout/orgChart1"/>
+    <dgm:cxn modelId="{72FF9501-D2B2-431F-88F7-7EADB11E439B}" type="presParOf" srcId="{B11B36A7-87A4-46E8-8862-96E69343A459}" destId="{E5BA0EF9-47AB-42EA-B055-806F16C694CB}" srcOrd="0" destOrd="0" presId="urn:microsoft.com/office/officeart/2005/8/layout/orgChart1"/>
+    <dgm:cxn modelId="{CCDEB392-4E94-4D1C-9056-D858099D4CA6}" type="presParOf" srcId="{E5BA0EF9-47AB-42EA-B055-806F16C694CB}" destId="{C5557B50-17AD-4498-992D-799031EA5B37}" srcOrd="0" destOrd="0" presId="urn:microsoft.com/office/officeart/2005/8/layout/orgChart1"/>
+    <dgm:cxn modelId="{190AA33E-DEB4-4CF0-AEDB-7BFEB9199307}" type="presParOf" srcId="{E5BA0EF9-47AB-42EA-B055-806F16C694CB}" destId="{AA289500-C62E-4335-99F0-3B71A01D0175}" srcOrd="1" destOrd="0" presId="urn:microsoft.com/office/officeart/2005/8/layout/orgChart1"/>
+    <dgm:cxn modelId="{3E963B49-8070-46CA-9678-BBBCAC345CBF}" type="presParOf" srcId="{B11B36A7-87A4-46E8-8862-96E69343A459}" destId="{C7BEDCC1-DC50-4778-998E-FE4DF25512C6}" srcOrd="1" destOrd="0" presId="urn:microsoft.com/office/officeart/2005/8/layout/orgChart1"/>
+    <dgm:cxn modelId="{AA7CFCB8-A43D-4678-8FBC-43CAD6003CF1}" type="presParOf" srcId="{B11B36A7-87A4-46E8-8862-96E69343A459}" destId="{FBC90197-2959-4D79-9F0F-7EC8CBFCB149}" srcOrd="2" destOrd="0" presId="urn:microsoft.com/office/officeart/2005/8/layout/orgChart1"/>
+    <dgm:cxn modelId="{CD441B10-C6BD-4BDB-81C7-82CB6029A2A6}" type="presParOf" srcId="{B5C24A73-47ED-431F-A421-7E4723DB4C5E}" destId="{9ED8D5FB-FE41-482F-8C51-333235D774CF}" srcOrd="2" destOrd="0" presId="urn:microsoft.com/office/officeart/2005/8/layout/orgChart1"/>
+    <dgm:cxn modelId="{515FEA41-2E00-4686-B602-BD26279F1737}" type="presParOf" srcId="{647756F6-1B21-49FD-B779-33C584EEA3AA}" destId="{5338CB64-B33A-4BED-ACE3-6D3BF3602705}" srcOrd="2" destOrd="0" presId="urn:microsoft.com/office/officeart/2005/8/layout/orgChart1"/>
+    <dgm:cxn modelId="{FF01D0B8-A48D-496E-B27F-34EA863D534F}" type="presParOf" srcId="{647756F6-1B21-49FD-B779-33C584EEA3AA}" destId="{F603711F-F085-4153-8C7E-9D35C7D15568}" srcOrd="3" destOrd="0" presId="urn:microsoft.com/office/officeart/2005/8/layout/orgChart1"/>
+    <dgm:cxn modelId="{4410B33D-CCEE-4165-9B48-1B501C0E083C}" type="presParOf" srcId="{F603711F-F085-4153-8C7E-9D35C7D15568}" destId="{732CB1A2-9756-4564-A51D-2936BFECC690}" srcOrd="0" destOrd="0" presId="urn:microsoft.com/office/officeart/2005/8/layout/orgChart1"/>
+    <dgm:cxn modelId="{31EC4DBC-F97C-4B05-8A69-9865EF66A06E}" type="presParOf" srcId="{732CB1A2-9756-4564-A51D-2936BFECC690}" destId="{6ACF9E05-724A-416E-ABB4-CF8C47774BA8}" srcOrd="0" destOrd="0" presId="urn:microsoft.com/office/officeart/2005/8/layout/orgChart1"/>
+    <dgm:cxn modelId="{6CFDF55D-CBB3-4F0B-B74F-8729FD5BDCE2}" type="presParOf" srcId="{732CB1A2-9756-4564-A51D-2936BFECC690}" destId="{AFCFFD40-0ACE-4B28-BA86-2A5868209EB7}" srcOrd="1" destOrd="0" presId="urn:microsoft.com/office/officeart/2005/8/layout/orgChart1"/>
+    <dgm:cxn modelId="{6E72C498-9CBA-4D04-AC8C-C58A018302B9}" type="presParOf" srcId="{F603711F-F085-4153-8C7E-9D35C7D15568}" destId="{AA2CBD5D-F35C-49D0-957E-9D0E3788D9A0}" srcOrd="1" destOrd="0" presId="urn:microsoft.com/office/officeart/2005/8/layout/orgChart1"/>
+    <dgm:cxn modelId="{DE67F4E7-C4CB-4B8F-868E-6965FA463402}" type="presParOf" srcId="{AA2CBD5D-F35C-49D0-957E-9D0E3788D9A0}" destId="{878E4F0B-3E20-4424-94B0-EBBA8BFE388B}" srcOrd="0" destOrd="0" presId="urn:microsoft.com/office/officeart/2005/8/layout/orgChart1"/>
+    <dgm:cxn modelId="{B157D5DD-D773-4DF9-83EA-C3EE6C578E07}" type="presParOf" srcId="{AA2CBD5D-F35C-49D0-957E-9D0E3788D9A0}" destId="{A45CE1FA-A605-4B2F-9B5D-60D37B86B126}" srcOrd="1" destOrd="0" presId="urn:microsoft.com/office/officeart/2005/8/layout/orgChart1"/>
+    <dgm:cxn modelId="{4E5CB189-3B8C-4EB7-8BC8-3873DFDDE24D}" type="presParOf" srcId="{A45CE1FA-A605-4B2F-9B5D-60D37B86B126}" destId="{94A96030-0ABA-401B-B307-97A3086EEF85}" srcOrd="0" destOrd="0" presId="urn:microsoft.com/office/officeart/2005/8/layout/orgChart1"/>
+    <dgm:cxn modelId="{334E378C-C1B2-4B16-A83C-F1DA28212B7B}" type="presParOf" srcId="{94A96030-0ABA-401B-B307-97A3086EEF85}" destId="{2E89FA2F-74F9-4765-B9E3-98D7DBD656AC}" srcOrd="0" destOrd="0" presId="urn:microsoft.com/office/officeart/2005/8/layout/orgChart1"/>
+    <dgm:cxn modelId="{34770D9A-7653-468A-BCB4-06E95A40A738}" type="presParOf" srcId="{94A96030-0ABA-401B-B307-97A3086EEF85}" destId="{31F30900-8B02-4BC1-9D2C-C5565E43B67E}" srcOrd="1" destOrd="0" presId="urn:microsoft.com/office/officeart/2005/8/layout/orgChart1"/>
+    <dgm:cxn modelId="{7716BEFF-B542-41E9-B3E3-86DEC45851D1}" type="presParOf" srcId="{A45CE1FA-A605-4B2F-9B5D-60D37B86B126}" destId="{6AC0227D-9A72-481B-8A15-EAB8F38C85D9}" srcOrd="1" destOrd="0" presId="urn:microsoft.com/office/officeart/2005/8/layout/orgChart1"/>
+    <dgm:cxn modelId="{2A849A1B-3CA3-4548-8AE5-86BAA75A46C7}" type="presParOf" srcId="{A45CE1FA-A605-4B2F-9B5D-60D37B86B126}" destId="{D20BD6BC-ACAC-4311-9910-00B67FD53BA4}" srcOrd="2" destOrd="0" presId="urn:microsoft.com/office/officeart/2005/8/layout/orgChart1"/>
+    <dgm:cxn modelId="{47A77102-C6E2-46D9-B2A3-AF1CF53C3F40}" type="presParOf" srcId="{F603711F-F085-4153-8C7E-9D35C7D15568}" destId="{451AF950-68FA-4C9A-8BAD-28B016035091}" srcOrd="2" destOrd="0" presId="urn:microsoft.com/office/officeart/2005/8/layout/orgChart1"/>
+    <dgm:cxn modelId="{A856DE82-2C3C-4F6B-B923-59D0FC7E8870}" type="presParOf" srcId="{35F06697-3895-4A49-865E-0857BC05BB58}" destId="{2BE215EB-CBBD-4653-8380-CBC3CA2ACE73}" srcOrd="2" destOrd="0" presId="urn:microsoft.com/office/officeart/2005/8/layout/orgChart1"/>
+    <dgm:cxn modelId="{230ACFBF-1B09-48D2-8763-40F11CA7AE9E}" type="presParOf" srcId="{68BDC7A9-CDE9-4D27-8F92-DA459D6626D6}" destId="{D3B7F450-9734-4EE7-9DDB-0C063BC7283C}" srcOrd="2" destOrd="0" presId="urn:microsoft.com/office/officeart/2005/8/layout/orgChart1"/>
+    <dgm:cxn modelId="{2B59C3F1-399B-4A01-B260-7F99B2442FCC}" type="presParOf" srcId="{68BDC7A9-CDE9-4D27-8F92-DA459D6626D6}" destId="{829124B6-0FBD-4771-BAB5-85E660C4C0D5}" srcOrd="3" destOrd="0" presId="urn:microsoft.com/office/officeart/2005/8/layout/orgChart1"/>
+    <dgm:cxn modelId="{E648B241-99FD-4360-958C-5DF8ED691C1B}" type="presParOf" srcId="{829124B6-0FBD-4771-BAB5-85E660C4C0D5}" destId="{FA6CBAB3-E22F-43EF-B25D-90B16CE138FE}" srcOrd="0" destOrd="0" presId="urn:microsoft.com/office/officeart/2005/8/layout/orgChart1"/>
+    <dgm:cxn modelId="{B7427903-191D-4DDA-B8C4-529DDE21B405}" type="presParOf" srcId="{FA6CBAB3-E22F-43EF-B25D-90B16CE138FE}" destId="{CC1418D4-4CBD-4B61-BC61-6226E3116DFA}" srcOrd="0" destOrd="0" presId="urn:microsoft.com/office/officeart/2005/8/layout/orgChart1"/>
+    <dgm:cxn modelId="{0147D475-5866-4D79-BDD6-96F44A0954B5}" type="presParOf" srcId="{FA6CBAB3-E22F-43EF-B25D-90B16CE138FE}" destId="{A04518F5-A788-4643-A8DF-898FAB6D3F7B}" srcOrd="1" destOrd="0" presId="urn:microsoft.com/office/officeart/2005/8/layout/orgChart1"/>
+    <dgm:cxn modelId="{C99E7361-2409-4A76-9931-DB217F7090AA}" type="presParOf" srcId="{829124B6-0FBD-4771-BAB5-85E660C4C0D5}" destId="{22582729-D103-4810-92E0-ACF46AA961CE}" srcOrd="1" destOrd="0" presId="urn:microsoft.com/office/officeart/2005/8/layout/orgChart1"/>
+    <dgm:cxn modelId="{FA1121FD-A0AF-458F-B73C-67F858CB7275}" type="presParOf" srcId="{22582729-D103-4810-92E0-ACF46AA961CE}" destId="{FBBEC861-BB57-4C30-A72B-B31BC72F3720}" srcOrd="0" destOrd="0" presId="urn:microsoft.com/office/officeart/2005/8/layout/orgChart1"/>
+    <dgm:cxn modelId="{C3683C15-7EA7-4467-93FB-7DF3C2B78002}" type="presParOf" srcId="{22582729-D103-4810-92E0-ACF46AA961CE}" destId="{5539B797-FF9B-43E5-A154-4D3E1A94808C}" srcOrd="1" destOrd="0" presId="urn:microsoft.com/office/officeart/2005/8/layout/orgChart1"/>
+    <dgm:cxn modelId="{4FA87F82-F70C-443B-9EDE-C7EF83C679CC}" type="presParOf" srcId="{5539B797-FF9B-43E5-A154-4D3E1A94808C}" destId="{1D0AC80E-77BA-407C-AB4E-501C4EAF1CB7}" srcOrd="0" destOrd="0" presId="urn:microsoft.com/office/officeart/2005/8/layout/orgChart1"/>
+    <dgm:cxn modelId="{D1E9C5E8-5329-4618-B7F2-615DF51A15B7}" type="presParOf" srcId="{1D0AC80E-77BA-407C-AB4E-501C4EAF1CB7}" destId="{90C65C7C-388A-4FF7-9C94-918F2FEAB691}" srcOrd="0" destOrd="0" presId="urn:microsoft.com/office/officeart/2005/8/layout/orgChart1"/>
+    <dgm:cxn modelId="{8EA4EC35-4A7F-48FB-9E0D-6711C72369C2}" type="presParOf" srcId="{1D0AC80E-77BA-407C-AB4E-501C4EAF1CB7}" destId="{FAF85B28-4734-4887-8AB6-0CD918DD9BD7}" srcOrd="1" destOrd="0" presId="urn:microsoft.com/office/officeart/2005/8/layout/orgChart1"/>
+    <dgm:cxn modelId="{4D535D4B-4D02-422C-B378-7561CFD42E31}" type="presParOf" srcId="{5539B797-FF9B-43E5-A154-4D3E1A94808C}" destId="{38A9DA92-07C3-447C-9264-AA29473CD6ED}" srcOrd="1" destOrd="0" presId="urn:microsoft.com/office/officeart/2005/8/layout/orgChart1"/>
+    <dgm:cxn modelId="{BA2F7B76-09F1-4A5F-BA71-4B1016993A56}" type="presParOf" srcId="{5539B797-FF9B-43E5-A154-4D3E1A94808C}" destId="{1FD28280-2159-4F33-A9C5-BD9ACBB49A63}" srcOrd="2" destOrd="0" presId="urn:microsoft.com/office/officeart/2005/8/layout/orgChart1"/>
+    <dgm:cxn modelId="{012FA5AE-BFA1-4B37-B163-9380D1284E89}" type="presParOf" srcId="{829124B6-0FBD-4771-BAB5-85E660C4C0D5}" destId="{BC6F35A4-E1D7-4292-B68F-361EA63E4C5E}" srcOrd="2" destOrd="0" presId="urn:microsoft.com/office/officeart/2005/8/layout/orgChart1"/>
+    <dgm:cxn modelId="{A28080CB-6F4C-4E12-9380-14C04038164A}" type="presParOf" srcId="{68BDC7A9-CDE9-4D27-8F92-DA459D6626D6}" destId="{294FF083-72AC-4592-9D4B-A62942A4F058}" srcOrd="4" destOrd="0" presId="urn:microsoft.com/office/officeart/2005/8/layout/orgChart1"/>
+    <dgm:cxn modelId="{720B926E-25EC-4831-B622-517A04187E93}" type="presParOf" srcId="{68BDC7A9-CDE9-4D27-8F92-DA459D6626D6}" destId="{A913C26F-99E0-4572-98FB-1E0FE3A2E522}" srcOrd="5" destOrd="0" presId="urn:microsoft.com/office/officeart/2005/8/layout/orgChart1"/>
+    <dgm:cxn modelId="{FF7E877A-D32C-4745-8D0A-413C103D7352}" type="presParOf" srcId="{A913C26F-99E0-4572-98FB-1E0FE3A2E522}" destId="{57D9D258-0C1F-472F-AEAD-C3C7FDEA1593}" srcOrd="0" destOrd="0" presId="urn:microsoft.com/office/officeart/2005/8/layout/orgChart1"/>
+    <dgm:cxn modelId="{55C51104-1078-42F5-B414-CC5D01AFF5CB}" type="presParOf" srcId="{57D9D258-0C1F-472F-AEAD-C3C7FDEA1593}" destId="{C668CE75-5F45-4F07-8A39-54FF0948F513}" srcOrd="0" destOrd="0" presId="urn:microsoft.com/office/officeart/2005/8/layout/orgChart1"/>
+    <dgm:cxn modelId="{BE5359A7-CA0D-4459-8CED-058BFF30E517}" type="presParOf" srcId="{57D9D258-0C1F-472F-AEAD-C3C7FDEA1593}" destId="{E6241A6E-F506-435F-9669-5DC1EC405E8C}" srcOrd="1" destOrd="0" presId="urn:microsoft.com/office/officeart/2005/8/layout/orgChart1"/>
+    <dgm:cxn modelId="{96387654-1319-4771-A6B0-0CA0074DED31}" type="presParOf" srcId="{A913C26F-99E0-4572-98FB-1E0FE3A2E522}" destId="{36C55FAD-2914-4BDA-AE24-C7F45E0039C2}" srcOrd="1" destOrd="0" presId="urn:microsoft.com/office/officeart/2005/8/layout/orgChart1"/>
+    <dgm:cxn modelId="{BFA046B3-8E92-40A2-B16A-39E16305D5D6}" type="presParOf" srcId="{36C55FAD-2914-4BDA-AE24-C7F45E0039C2}" destId="{DA39AD2B-53B1-4B12-8665-AF4B29F307FB}" srcOrd="0" destOrd="0" presId="urn:microsoft.com/office/officeart/2005/8/layout/orgChart1"/>
+    <dgm:cxn modelId="{C7635241-33C5-420F-8450-A692D460FE1B}" type="presParOf" srcId="{36C55FAD-2914-4BDA-AE24-C7F45E0039C2}" destId="{253DE851-C592-45C8-9AE6-63554E5B2B74}" srcOrd="1" destOrd="0" presId="urn:microsoft.com/office/officeart/2005/8/layout/orgChart1"/>
+    <dgm:cxn modelId="{DB18CEA9-C208-4198-A2D5-8AA7013540E5}" type="presParOf" srcId="{253DE851-C592-45C8-9AE6-63554E5B2B74}" destId="{622E3F3A-9D91-44EC-B162-43A734B36CCB}" srcOrd="0" destOrd="0" presId="urn:microsoft.com/office/officeart/2005/8/layout/orgChart1"/>
+    <dgm:cxn modelId="{19BB7621-62CB-499C-8D7B-CA4817F63CA9}" type="presParOf" srcId="{622E3F3A-9D91-44EC-B162-43A734B36CCB}" destId="{892BD28F-03E1-4D71-AD0F-AAFD29BCD7DF}" srcOrd="0" destOrd="0" presId="urn:microsoft.com/office/officeart/2005/8/layout/orgChart1"/>
+    <dgm:cxn modelId="{AC145D08-C6E7-4AC9-8C22-8EF88CE6080A}" type="presParOf" srcId="{622E3F3A-9D91-44EC-B162-43A734B36CCB}" destId="{396C34AD-EEFC-4B1C-84BC-869F399E8ED9}" srcOrd="1" destOrd="0" presId="urn:microsoft.com/office/officeart/2005/8/layout/orgChart1"/>
+    <dgm:cxn modelId="{A8779B7B-152C-4592-8FA5-556EB6069AC4}" type="presParOf" srcId="{253DE851-C592-45C8-9AE6-63554E5B2B74}" destId="{D6126C01-FB41-4768-A124-366EF1936F7C}" srcOrd="1" destOrd="0" presId="urn:microsoft.com/office/officeart/2005/8/layout/orgChart1"/>
+    <dgm:cxn modelId="{83E63EBE-0470-4966-8F34-C45F635442DD}" type="presParOf" srcId="{253DE851-C592-45C8-9AE6-63554E5B2B74}" destId="{9C624EB5-7A36-43BF-A9F0-C37C8C8CBFD4}" srcOrd="2" destOrd="0" presId="urn:microsoft.com/office/officeart/2005/8/layout/orgChart1"/>
+    <dgm:cxn modelId="{57F4CB74-4559-40CD-8AA3-1782088FDD4B}" type="presParOf" srcId="{A913C26F-99E0-4572-98FB-1E0FE3A2E522}" destId="{231136D4-1B73-4DA2-B7CD-D91A16F99FE6}" srcOrd="2" destOrd="0" presId="urn:microsoft.com/office/officeart/2005/8/layout/orgChart1"/>
+    <dgm:cxn modelId="{E305965D-D479-453D-8F01-FE3177F83BF7}" type="presParOf" srcId="{68BDC7A9-CDE9-4D27-8F92-DA459D6626D6}" destId="{6BD62762-A74B-4D5D-8EDB-0897C75ADE82}" srcOrd="6" destOrd="0" presId="urn:microsoft.com/office/officeart/2005/8/layout/orgChart1"/>
+    <dgm:cxn modelId="{B4371A03-78AF-4735-B4C2-91CF53523ADF}" type="presParOf" srcId="{68BDC7A9-CDE9-4D27-8F92-DA459D6626D6}" destId="{8BA36EB3-DAEA-4AC5-AE99-AA43F1E32237}" srcOrd="7" destOrd="0" presId="urn:microsoft.com/office/officeart/2005/8/layout/orgChart1"/>
+    <dgm:cxn modelId="{8C7EF20E-7851-485F-8169-425419390B8E}" type="presParOf" srcId="{8BA36EB3-DAEA-4AC5-AE99-AA43F1E32237}" destId="{4F89A336-9FE2-4F42-A330-52D6A2C5DC77}" srcOrd="0" destOrd="0" presId="urn:microsoft.com/office/officeart/2005/8/layout/orgChart1"/>
+    <dgm:cxn modelId="{900067A2-D543-43FE-A3A4-0312A0D5C9D6}" type="presParOf" srcId="{4F89A336-9FE2-4F42-A330-52D6A2C5DC77}" destId="{95818E8C-F0F7-42E9-8C3D-12C643641ED5}" srcOrd="0" destOrd="0" presId="urn:microsoft.com/office/officeart/2005/8/layout/orgChart1"/>
+    <dgm:cxn modelId="{13531053-39D6-4DD8-A6A6-570A3B2C5F2C}" type="presParOf" srcId="{4F89A336-9FE2-4F42-A330-52D6A2C5DC77}" destId="{BE8D3007-A1C1-4926-ACBA-6BE297FC218E}" srcOrd="1" destOrd="0" presId="urn:microsoft.com/office/officeart/2005/8/layout/orgChart1"/>
+    <dgm:cxn modelId="{91CA03FA-AB7A-46BB-A57F-B8814BEB918F}" type="presParOf" srcId="{8BA36EB3-DAEA-4AC5-AE99-AA43F1E32237}" destId="{59756FA6-B3C8-47C8-8988-0676103424AB}" srcOrd="1" destOrd="0" presId="urn:microsoft.com/office/officeart/2005/8/layout/orgChart1"/>
+    <dgm:cxn modelId="{A64BBDB4-6792-41C2-9765-BF0361509E22}" type="presParOf" srcId="{59756FA6-B3C8-47C8-8988-0676103424AB}" destId="{06A4B5E5-63F5-4D43-85F9-A5086BC312FD}" srcOrd="0" destOrd="0" presId="urn:microsoft.com/office/officeart/2005/8/layout/orgChart1"/>
+    <dgm:cxn modelId="{0E4B583A-0011-4899-983A-1778527C45BC}" type="presParOf" srcId="{59756FA6-B3C8-47C8-8988-0676103424AB}" destId="{A4E93967-B642-4E18-B3BB-1FEDE6C5A64E}" srcOrd="1" destOrd="0" presId="urn:microsoft.com/office/officeart/2005/8/layout/orgChart1"/>
+    <dgm:cxn modelId="{84453013-8B87-4C4B-8361-58B565C372B4}" type="presParOf" srcId="{A4E93967-B642-4E18-B3BB-1FEDE6C5A64E}" destId="{85E87F8D-DF54-4335-99B5-461383867094}" srcOrd="0" destOrd="0" presId="urn:microsoft.com/office/officeart/2005/8/layout/orgChart1"/>
+    <dgm:cxn modelId="{0D4C6E5B-9A37-4881-8E30-CACEFD12DA49}" type="presParOf" srcId="{85E87F8D-DF54-4335-99B5-461383867094}" destId="{C4412BE2-ECCF-406E-AA8E-B74753721C46}" srcOrd="0" destOrd="0" presId="urn:microsoft.com/office/officeart/2005/8/layout/orgChart1"/>
+    <dgm:cxn modelId="{0F56B91C-CAE2-4AB4-90C6-C192101D1D7C}" type="presParOf" srcId="{85E87F8D-DF54-4335-99B5-461383867094}" destId="{6B947019-3E19-4EA0-BC88-C55D27554B62}" srcOrd="1" destOrd="0" presId="urn:microsoft.com/office/officeart/2005/8/layout/orgChart1"/>
+    <dgm:cxn modelId="{2031A5E8-FD2F-4C0D-BEEE-7D34B88D0F79}" type="presParOf" srcId="{A4E93967-B642-4E18-B3BB-1FEDE6C5A64E}" destId="{904CF44F-1A43-48C2-80EA-FDCB21FAC775}" srcOrd="1" destOrd="0" presId="urn:microsoft.com/office/officeart/2005/8/layout/orgChart1"/>
+    <dgm:cxn modelId="{DFC209AB-55CC-4318-AEC2-52A558B30C2E}" type="presParOf" srcId="{A4E93967-B642-4E18-B3BB-1FEDE6C5A64E}" destId="{1F8DD891-1B3D-48AA-A014-82FFC477FFAA}" srcOrd="2" destOrd="0" presId="urn:microsoft.com/office/officeart/2005/8/layout/orgChart1"/>
+    <dgm:cxn modelId="{73AE72F2-1B20-40C9-94AA-58E3E4A5B28F}" type="presParOf" srcId="{8BA36EB3-DAEA-4AC5-AE99-AA43F1E32237}" destId="{CA1A08E2-0763-4996-9872-4EB6A1CD1B3F}" srcOrd="2" destOrd="0" presId="urn:microsoft.com/office/officeart/2005/8/layout/orgChart1"/>
     <dgm:cxn modelId="{74803215-7767-4602-A6C6-BD1C12A576CD}" type="presParOf" srcId="{0FB25FAB-2169-4CB4-900D-BD99A5FABB34}" destId="{086F99DF-9E27-4DA4-BB0F-8F5C8CD4BCC9}" srcOrd="2" destOrd="0" presId="urn:microsoft.com/office/officeart/2005/8/layout/orgChart1"/>
     <dgm:cxn modelId="{B5EF7F67-9201-4FA0-B2A5-607DA5E19199}" type="presParOf" srcId="{8FF893B5-F116-47BD-BD0A-6292E77540BA}" destId="{A2E9D2ED-EEC3-4773-9B4A-8261DF17F3B9}" srcOrd="1" destOrd="0" presId="urn:microsoft.com/office/officeart/2005/8/layout/orgChart1"/>
     <dgm:cxn modelId="{E312A4C9-6293-4659-ACF7-B08C79F196BA}" type="presParOf" srcId="{A2E9D2ED-EEC3-4773-9B4A-8261DF17F3B9}" destId="{90BB31E3-BE17-4D7E-9EC6-BBF90A742B42}" srcOrd="0" destOrd="0" presId="urn:microsoft.com/office/officeart/2005/8/layout/orgChart1"/>
@@ -4494,8 +4663,8 @@
       </dsp:nvSpPr>
       <dsp:spPr>
         <a:xfrm>
-          <a:off x="8862300" y="1902569"/>
-          <a:ext cx="91440" cy="276613"/>
+          <a:off x="8955607" y="1726309"/>
+          <a:ext cx="91440" cy="237053"/>
         </a:xfrm>
         <a:custGeom>
           <a:avLst/>
@@ -4509,7 +4678,7 @@
                 <a:pt x="45720" y="0"/>
               </a:moveTo>
               <a:lnTo>
-                <a:pt x="45720" y="276613"/>
+                <a:pt x="45720" y="237053"/>
               </a:lnTo>
             </a:path>
           </a:pathLst>
@@ -4548,8 +4717,8 @@
       </dsp:nvSpPr>
       <dsp:spPr>
         <a:xfrm>
-          <a:off x="6787319" y="3773002"/>
-          <a:ext cx="197580" cy="605914"/>
+          <a:off x="7183919" y="3329241"/>
+          <a:ext cx="169323" cy="519259"/>
         </a:xfrm>
         <a:custGeom>
           <a:avLst/>
@@ -4563,10 +4732,10 @@
                 <a:pt x="0" y="0"/>
               </a:moveTo>
               <a:lnTo>
-                <a:pt x="0" y="605914"/>
+                <a:pt x="0" y="519259"/>
               </a:lnTo>
               <a:lnTo>
-                <a:pt x="197580" y="605914"/>
+                <a:pt x="169323" y="519259"/>
               </a:lnTo>
             </a:path>
           </a:pathLst>
@@ -4605,8 +4774,8 @@
       </dsp:nvSpPr>
       <dsp:spPr>
         <a:xfrm>
-          <a:off x="7268481" y="2837786"/>
-          <a:ext cx="91440" cy="276613"/>
+          <a:off x="7589729" y="2527775"/>
+          <a:ext cx="91440" cy="237053"/>
         </a:xfrm>
         <a:custGeom>
           <a:avLst/>
@@ -4620,7 +4789,7 @@
                 <a:pt x="45720" y="0"/>
               </a:moveTo>
               <a:lnTo>
-                <a:pt x="45720" y="276613"/>
+                <a:pt x="45720" y="237053"/>
               </a:lnTo>
             </a:path>
           </a:pathLst>
@@ -4659,8 +4828,8 @@
       </dsp:nvSpPr>
       <dsp:spPr>
         <a:xfrm>
-          <a:off x="7268481" y="1902569"/>
-          <a:ext cx="91440" cy="276613"/>
+          <a:off x="7589729" y="1726309"/>
+          <a:ext cx="91440" cy="237053"/>
         </a:xfrm>
         <a:custGeom>
           <a:avLst/>
@@ -4674,7 +4843,7 @@
                 <a:pt x="45720" y="0"/>
               </a:moveTo>
               <a:lnTo>
-                <a:pt x="45720" y="276613"/>
+                <a:pt x="45720" y="237053"/>
               </a:lnTo>
             </a:path>
           </a:pathLst>
@@ -4706,15 +4875,15 @@
         <a:fontRef idx="minor"/>
       </dsp:style>
     </dsp:sp>
-    <dsp:sp modelId="{DA39AD2B-53B1-4B12-8665-AF4B29F307FB}">
+    <dsp:sp modelId="{06A4B5E5-63F5-4D43-85F9-A5086BC312FD}">
       <dsp:nvSpPr>
         <dsp:cNvPr id="0" name=""/>
         <dsp:cNvSpPr/>
       </dsp:nvSpPr>
       <dsp:spPr>
         <a:xfrm>
-          <a:off x="4864198" y="2837786"/>
-          <a:ext cx="197580" cy="605914"/>
+          <a:off x="5535835" y="2527775"/>
+          <a:ext cx="169323" cy="852480"/>
         </a:xfrm>
         <a:custGeom>
           <a:avLst/>
@@ -4728,10 +4897,10 @@
                 <a:pt x="0" y="0"/>
               </a:moveTo>
               <a:lnTo>
-                <a:pt x="0" y="605914"/>
+                <a:pt x="0" y="852480"/>
               </a:lnTo>
               <a:lnTo>
-                <a:pt x="197580" y="605914"/>
+                <a:pt x="169323" y="852480"/>
               </a:lnTo>
             </a:path>
           </a:pathLst>
@@ -4763,15 +4932,15 @@
         <a:fontRef idx="minor"/>
       </dsp:style>
     </dsp:sp>
-    <dsp:sp modelId="{294FF083-72AC-4592-9D4B-A62942A4F058}">
+    <dsp:sp modelId="{6BD62762-A74B-4D5D-8EDB-0897C75ADE82}">
       <dsp:nvSpPr>
         <dsp:cNvPr id="0" name=""/>
         <dsp:cNvSpPr/>
       </dsp:nvSpPr>
       <dsp:spPr>
         <a:xfrm>
-          <a:off x="3425151" y="1902569"/>
-          <a:ext cx="1965929" cy="276613"/>
+          <a:off x="3619654" y="1726309"/>
+          <a:ext cx="2367710" cy="237053"/>
         </a:xfrm>
         <a:custGeom>
           <a:avLst/>
@@ -4785,13 +4954,13 @@
                 <a:pt x="0" y="0"/>
               </a:moveTo>
               <a:lnTo>
-                <a:pt x="0" y="138306"/>
+                <a:pt x="0" y="118526"/>
               </a:lnTo>
               <a:lnTo>
-                <a:pt x="1965929" y="138306"/>
+                <a:pt x="2367710" y="118526"/>
               </a:lnTo>
               <a:lnTo>
-                <a:pt x="1965929" y="276613"/>
+                <a:pt x="2367710" y="237053"/>
               </a:lnTo>
             </a:path>
           </a:pathLst>
@@ -4823,15 +4992,15 @@
         <a:fontRef idx="minor"/>
       </dsp:style>
     </dsp:sp>
-    <dsp:sp modelId="{FBBEC861-BB57-4C30-A72B-B31BC72F3720}">
+    <dsp:sp modelId="{DA39AD2B-53B1-4B12-8665-AF4B29F307FB}">
       <dsp:nvSpPr>
         <dsp:cNvPr id="0" name=""/>
         <dsp:cNvSpPr/>
       </dsp:nvSpPr>
       <dsp:spPr>
         <a:xfrm>
-          <a:off x="2993766" y="2837786"/>
-          <a:ext cx="197580" cy="734734"/>
+          <a:off x="4169956" y="2527775"/>
+          <a:ext cx="169323" cy="619256"/>
         </a:xfrm>
         <a:custGeom>
           <a:avLst/>
@@ -4845,10 +5014,10 @@
                 <a:pt x="0" y="0"/>
               </a:moveTo>
               <a:lnTo>
-                <a:pt x="0" y="734734"/>
+                <a:pt x="0" y="619256"/>
               </a:lnTo>
               <a:lnTo>
-                <a:pt x="197580" y="734734"/>
+                <a:pt x="169323" y="619256"/>
               </a:lnTo>
             </a:path>
           </a:pathLst>
@@ -4880,15 +5049,15 @@
         <a:fontRef idx="minor"/>
       </dsp:style>
     </dsp:sp>
-    <dsp:sp modelId="{D3B7F450-9734-4EE7-9DDB-0C063BC7283C}">
+    <dsp:sp modelId="{294FF083-72AC-4592-9D4B-A62942A4F058}">
       <dsp:nvSpPr>
         <dsp:cNvPr id="0" name=""/>
         <dsp:cNvSpPr/>
       </dsp:nvSpPr>
       <dsp:spPr>
         <a:xfrm>
-          <a:off x="3425151" y="1902569"/>
-          <a:ext cx="95497" cy="276613"/>
+          <a:off x="3619654" y="1726309"/>
+          <a:ext cx="1001832" cy="237053"/>
         </a:xfrm>
         <a:custGeom>
           <a:avLst/>
@@ -4902,13 +5071,13 @@
                 <a:pt x="0" y="0"/>
               </a:moveTo>
               <a:lnTo>
-                <a:pt x="0" y="138306"/>
+                <a:pt x="0" y="118526"/>
               </a:lnTo>
               <a:lnTo>
-                <a:pt x="95497" y="138306"/>
+                <a:pt x="1001832" y="118526"/>
               </a:lnTo>
               <a:lnTo>
-                <a:pt x="95497" y="276613"/>
+                <a:pt x="1001832" y="237053"/>
               </a:lnTo>
             </a:path>
           </a:pathLst>
@@ -4940,15 +5109,15 @@
         <a:fontRef idx="minor"/>
       </dsp:style>
     </dsp:sp>
-    <dsp:sp modelId="{878E4F0B-3E20-4424-94B0-EBBA8BFE388B}">
+    <dsp:sp modelId="{FBBEC861-BB57-4C30-A72B-B31BC72F3720}">
       <dsp:nvSpPr>
         <dsp:cNvPr id="0" name=""/>
         <dsp:cNvSpPr/>
       </dsp:nvSpPr>
       <dsp:spPr>
         <a:xfrm>
-          <a:off x="1729248" y="3773002"/>
-          <a:ext cx="197580" cy="951756"/>
+          <a:off x="2567025" y="2527775"/>
+          <a:ext cx="169323" cy="629655"/>
         </a:xfrm>
         <a:custGeom>
           <a:avLst/>
@@ -4962,10 +5131,127 @@
                 <a:pt x="0" y="0"/>
               </a:moveTo>
               <a:lnTo>
-                <a:pt x="0" y="951756"/>
+                <a:pt x="0" y="629655"/>
               </a:lnTo>
               <a:lnTo>
-                <a:pt x="197580" y="951756"/>
+                <a:pt x="169323" y="629655"/>
+              </a:lnTo>
+            </a:path>
+          </a:pathLst>
+        </a:custGeom>
+        <a:noFill/>
+        <a:ln w="9525" cap="flat" cmpd="sng" algn="ctr">
+          <a:solidFill>
+            <a:schemeClr val="accent5">
+              <a:hueOff val="0"/>
+              <a:satOff val="0"/>
+              <a:lumOff val="0"/>
+              <a:alphaOff val="0"/>
+            </a:schemeClr>
+          </a:solidFill>
+          <a:prstDash val="solid"/>
+        </a:ln>
+        <a:effectLst/>
+      </dsp:spPr>
+      <dsp:style>
+        <a:lnRef idx="1">
+          <a:scrgbClr r="0" g="0" b="0"/>
+        </a:lnRef>
+        <a:fillRef idx="0">
+          <a:scrgbClr r="0" g="0" b="0"/>
+        </a:fillRef>
+        <a:effectRef idx="0">
+          <a:scrgbClr r="0" g="0" b="0"/>
+        </a:effectRef>
+        <a:fontRef idx="minor"/>
+      </dsp:style>
+    </dsp:sp>
+    <dsp:sp modelId="{D3B7F450-9734-4EE7-9DDB-0C063BC7283C}">
+      <dsp:nvSpPr>
+        <dsp:cNvPr id="0" name=""/>
+        <dsp:cNvSpPr/>
+      </dsp:nvSpPr>
+      <dsp:spPr>
+        <a:xfrm>
+          <a:off x="3018555" y="1726309"/>
+          <a:ext cx="601099" cy="237053"/>
+        </a:xfrm>
+        <a:custGeom>
+          <a:avLst/>
+          <a:gdLst/>
+          <a:ahLst/>
+          <a:cxnLst/>
+          <a:rect l="0" t="0" r="0" b="0"/>
+          <a:pathLst>
+            <a:path>
+              <a:moveTo>
+                <a:pt x="601099" y="0"/>
+              </a:moveTo>
+              <a:lnTo>
+                <a:pt x="601099" y="118526"/>
+              </a:lnTo>
+              <a:lnTo>
+                <a:pt x="0" y="118526"/>
+              </a:lnTo>
+              <a:lnTo>
+                <a:pt x="0" y="237053"/>
+              </a:lnTo>
+            </a:path>
+          </a:pathLst>
+        </a:custGeom>
+        <a:noFill/>
+        <a:ln w="9525" cap="flat" cmpd="sng" algn="ctr">
+          <a:solidFill>
+            <a:schemeClr val="accent4">
+              <a:hueOff val="0"/>
+              <a:satOff val="0"/>
+              <a:lumOff val="0"/>
+              <a:alphaOff val="0"/>
+            </a:schemeClr>
+          </a:solidFill>
+          <a:prstDash val="solid"/>
+        </a:ln>
+        <a:effectLst/>
+      </dsp:spPr>
+      <dsp:style>
+        <a:lnRef idx="1">
+          <a:scrgbClr r="0" g="0" b="0"/>
+        </a:lnRef>
+        <a:fillRef idx="0">
+          <a:scrgbClr r="0" g="0" b="0"/>
+        </a:fillRef>
+        <a:effectRef idx="0">
+          <a:scrgbClr r="0" g="0" b="0"/>
+        </a:effectRef>
+        <a:fontRef idx="minor"/>
+      </dsp:style>
+    </dsp:sp>
+    <dsp:sp modelId="{878E4F0B-3E20-4424-94B0-EBBA8BFE388B}">
+      <dsp:nvSpPr>
+        <dsp:cNvPr id="0" name=""/>
+        <dsp:cNvSpPr/>
+      </dsp:nvSpPr>
+      <dsp:spPr>
+        <a:xfrm>
+          <a:off x="1483353" y="3329241"/>
+          <a:ext cx="169323" cy="1194892"/>
+        </a:xfrm>
+        <a:custGeom>
+          <a:avLst/>
+          <a:gdLst/>
+          <a:ahLst/>
+          <a:cxnLst/>
+          <a:rect l="0" t="0" r="0" b="0"/>
+          <a:pathLst>
+            <a:path>
+              <a:moveTo>
+                <a:pt x="0" y="0"/>
+              </a:moveTo>
+              <a:lnTo>
+                <a:pt x="0" y="1194892"/>
+              </a:lnTo>
+              <a:lnTo>
+                <a:pt x="169323" y="1194892"/>
               </a:lnTo>
             </a:path>
           </a:pathLst>
@@ -5004,8 +5290,8 @@
       </dsp:nvSpPr>
       <dsp:spPr>
         <a:xfrm>
-          <a:off x="1459221" y="2837786"/>
-          <a:ext cx="796909" cy="276613"/>
+          <a:off x="1251944" y="2527775"/>
+          <a:ext cx="682939" cy="237053"/>
         </a:xfrm>
         <a:custGeom>
           <a:avLst/>
@@ -5019,13 +5305,13 @@
                 <a:pt x="0" y="0"/>
               </a:moveTo>
               <a:lnTo>
-                <a:pt x="0" y="138306"/>
+                <a:pt x="0" y="118526"/>
               </a:lnTo>
               <a:lnTo>
-                <a:pt x="796909" y="138306"/>
+                <a:pt x="682939" y="118526"/>
               </a:lnTo>
               <a:lnTo>
-                <a:pt x="796909" y="276613"/>
+                <a:pt x="682939" y="237053"/>
               </a:lnTo>
             </a:path>
           </a:pathLst>
@@ -5064,8 +5350,8 @@
       </dsp:nvSpPr>
       <dsp:spPr>
         <a:xfrm>
-          <a:off x="135429" y="3773002"/>
-          <a:ext cx="197580" cy="732297"/>
+          <a:off x="117475" y="3329241"/>
+          <a:ext cx="169323" cy="627567"/>
         </a:xfrm>
         <a:custGeom>
           <a:avLst/>
@@ -5079,10 +5365,10 @@
                 <a:pt x="0" y="0"/>
               </a:moveTo>
               <a:lnTo>
-                <a:pt x="0" y="732297"/>
+                <a:pt x="0" y="627567"/>
               </a:lnTo>
               <a:lnTo>
-                <a:pt x="197580" y="732297"/>
+                <a:pt x="169323" y="627567"/>
               </a:lnTo>
             </a:path>
           </a:pathLst>
@@ -5121,8 +5407,8 @@
       </dsp:nvSpPr>
       <dsp:spPr>
         <a:xfrm>
-          <a:off x="662312" y="2837786"/>
-          <a:ext cx="796909" cy="276613"/>
+          <a:off x="569005" y="2527775"/>
+          <a:ext cx="682939" cy="237053"/>
         </a:xfrm>
         <a:custGeom>
           <a:avLst/>
@@ -5133,16 +5419,16 @@
           <a:pathLst>
             <a:path>
               <a:moveTo>
-                <a:pt x="796909" y="0"/>
+                <a:pt x="682939" y="0"/>
               </a:moveTo>
               <a:lnTo>
-                <a:pt x="796909" y="138306"/>
+                <a:pt x="682939" y="118526"/>
               </a:lnTo>
               <a:lnTo>
-                <a:pt x="0" y="138306"/>
+                <a:pt x="0" y="118526"/>
               </a:lnTo>
               <a:lnTo>
-                <a:pt x="0" y="276613"/>
+                <a:pt x="0" y="237053"/>
               </a:lnTo>
             </a:path>
           </a:pathLst>
@@ -5181,8 +5467,8 @@
       </dsp:nvSpPr>
       <dsp:spPr>
         <a:xfrm>
-          <a:off x="1459221" y="1902569"/>
-          <a:ext cx="1965929" cy="276613"/>
+          <a:off x="1251944" y="1726309"/>
+          <a:ext cx="2367710" cy="237053"/>
         </a:xfrm>
         <a:custGeom>
           <a:avLst/>
@@ -5193,16 +5479,16 @@
           <a:pathLst>
             <a:path>
               <a:moveTo>
-                <a:pt x="1965929" y="0"/>
+                <a:pt x="2367710" y="0"/>
               </a:moveTo>
               <a:lnTo>
-                <a:pt x="1965929" y="138306"/>
+                <a:pt x="2367710" y="118526"/>
               </a:lnTo>
               <a:lnTo>
-                <a:pt x="0" y="138306"/>
+                <a:pt x="0" y="118526"/>
               </a:lnTo>
               <a:lnTo>
-                <a:pt x="0" y="276613"/>
+                <a:pt x="0" y="237053"/>
               </a:lnTo>
             </a:path>
           </a:pathLst>
@@ -5241,8 +5527,8 @@
       </dsp:nvSpPr>
       <dsp:spPr>
         <a:xfrm>
-          <a:off x="2766548" y="1243967"/>
-          <a:ext cx="1317205" cy="658602"/>
+          <a:off x="3055242" y="1161897"/>
+          <a:ext cx="1128824" cy="564412"/>
         </a:xfrm>
         <a:prstGeom prst="rect">
           <a:avLst/>
@@ -5299,8 +5585,8 @@
         </a:p>
       </dsp:txBody>
       <dsp:txXfrm>
-        <a:off x="2766548" y="1243967"/>
-        <a:ext cx="1317205" cy="658602"/>
+        <a:off x="3055242" y="1161897"/>
+        <a:ext cx="1128824" cy="564412"/>
       </dsp:txXfrm>
     </dsp:sp>
     <dsp:sp modelId="{CA1F7424-3DD7-40E9-825C-9CAEA377D9AC}">
@@ -5310,8 +5596,8 @@
       </dsp:nvSpPr>
       <dsp:spPr>
         <a:xfrm>
-          <a:off x="800618" y="2179183"/>
-          <a:ext cx="1317205" cy="658602"/>
+          <a:off x="687531" y="1963363"/>
+          <a:ext cx="1128824" cy="564412"/>
         </a:xfrm>
         <a:prstGeom prst="rect">
           <a:avLst/>
@@ -5368,8 +5654,8 @@
         </a:p>
       </dsp:txBody>
       <dsp:txXfrm>
-        <a:off x="800618" y="2179183"/>
-        <a:ext cx="1317205" cy="658602"/>
+        <a:off x="687531" y="1963363"/>
+        <a:ext cx="1128824" cy="564412"/>
       </dsp:txXfrm>
     </dsp:sp>
     <dsp:sp modelId="{FFE19F79-B535-4863-B4C1-1FF8E2C5BB5C}">
@@ -5379,8 +5665,8 @@
       </dsp:nvSpPr>
       <dsp:spPr>
         <a:xfrm>
-          <a:off x="3709" y="3114399"/>
-          <a:ext cx="1317205" cy="658602"/>
+          <a:off x="4592" y="2764828"/>
+          <a:ext cx="1128824" cy="564412"/>
         </a:xfrm>
         <a:prstGeom prst="rect">
           <a:avLst/>
@@ -5437,8 +5723,8 @@
         </a:p>
       </dsp:txBody>
       <dsp:txXfrm>
-        <a:off x="3709" y="3114399"/>
-        <a:ext cx="1317205" cy="658602"/>
+        <a:off x="4592" y="2764828"/>
+        <a:ext cx="1128824" cy="564412"/>
       </dsp:txXfrm>
     </dsp:sp>
     <dsp:sp modelId="{C5557B50-17AD-4498-992D-799031EA5B37}">
@@ -5448,8 +5734,8 @@
       </dsp:nvSpPr>
       <dsp:spPr>
         <a:xfrm>
-          <a:off x="333010" y="4049615"/>
-          <a:ext cx="1317205" cy="911368"/>
+          <a:off x="286798" y="3566294"/>
+          <a:ext cx="1128824" cy="781028"/>
         </a:xfrm>
         <a:prstGeom prst="rect">
           <a:avLst/>
@@ -5506,8 +5792,8 @@
         </a:p>
       </dsp:txBody>
       <dsp:txXfrm>
-        <a:off x="333010" y="4049615"/>
-        <a:ext cx="1317205" cy="911368"/>
+        <a:off x="286798" y="3566294"/>
+        <a:ext cx="1128824" cy="781028"/>
       </dsp:txXfrm>
     </dsp:sp>
     <dsp:sp modelId="{6ACF9E05-724A-416E-ABB4-CF8C47774BA8}">
@@ -5517,8 +5803,8 @@
       </dsp:nvSpPr>
       <dsp:spPr>
         <a:xfrm>
-          <a:off x="1597528" y="3114399"/>
-          <a:ext cx="1317205" cy="658602"/>
+          <a:off x="1370470" y="2764828"/>
+          <a:ext cx="1128824" cy="564412"/>
         </a:xfrm>
         <a:prstGeom prst="rect">
           <a:avLst/>
@@ -5575,8 +5861,8 @@
         </a:p>
       </dsp:txBody>
       <dsp:txXfrm>
-        <a:off x="1597528" y="3114399"/>
-        <a:ext cx="1317205" cy="658602"/>
+        <a:off x="1370470" y="2764828"/>
+        <a:ext cx="1128824" cy="564412"/>
       </dsp:txXfrm>
     </dsp:sp>
     <dsp:sp modelId="{2E89FA2F-74F9-4765-B9E3-98D7DBD656AC}">
@@ -5586,8 +5872,8 @@
       </dsp:nvSpPr>
       <dsp:spPr>
         <a:xfrm>
-          <a:off x="1926829" y="4049615"/>
-          <a:ext cx="1317205" cy="1350287"/>
+          <a:off x="1652677" y="3566294"/>
+          <a:ext cx="1128824" cy="1915678"/>
         </a:xfrm>
         <a:prstGeom prst="rect">
           <a:avLst/>
@@ -5644,8 +5930,8 @@
         </a:p>
       </dsp:txBody>
       <dsp:txXfrm>
-        <a:off x="1926829" y="4049615"/>
-        <a:ext cx="1317205" cy="1350287"/>
+        <a:off x="1652677" y="3566294"/>
+        <a:ext cx="1128824" cy="1915678"/>
       </dsp:txXfrm>
     </dsp:sp>
     <dsp:sp modelId="{CC1418D4-4CBD-4B61-BC61-6226E3116DFA}">
@@ -5655,8 +5941,8 @@
       </dsp:nvSpPr>
       <dsp:spPr>
         <a:xfrm>
-          <a:off x="2862045" y="2179183"/>
-          <a:ext cx="1317205" cy="658602"/>
+          <a:off x="2454142" y="1963363"/>
+          <a:ext cx="1128824" cy="564412"/>
         </a:xfrm>
         <a:prstGeom prst="rect">
           <a:avLst/>
@@ -5713,8 +5999,8 @@
         </a:p>
       </dsp:txBody>
       <dsp:txXfrm>
-        <a:off x="2862045" y="2179183"/>
-        <a:ext cx="1317205" cy="658602"/>
+        <a:off x="2454142" y="1963363"/>
+        <a:ext cx="1128824" cy="564412"/>
       </dsp:txXfrm>
     </dsp:sp>
     <dsp:sp modelId="{90C65C7C-388A-4FF7-9C94-918F2FEAB691}">
@@ -5724,8 +6010,8 @@
       </dsp:nvSpPr>
       <dsp:spPr>
         <a:xfrm>
-          <a:off x="3191347" y="3114399"/>
-          <a:ext cx="1593819" cy="916241"/>
+          <a:off x="2736349" y="2764828"/>
+          <a:ext cx="1365878" cy="785205"/>
         </a:xfrm>
         <a:prstGeom prst="rect">
           <a:avLst/>
@@ -5782,8 +6068,8 @@
         </a:p>
       </dsp:txBody>
       <dsp:txXfrm>
-        <a:off x="3191347" y="3114399"/>
-        <a:ext cx="1593819" cy="916241"/>
+        <a:off x="2736349" y="2764828"/>
+        <a:ext cx="1365878" cy="785205"/>
       </dsp:txXfrm>
     </dsp:sp>
     <dsp:sp modelId="{C668CE75-5F45-4F07-8A39-54FF0948F513}">
@@ -5793,8 +6079,8 @@
       </dsp:nvSpPr>
       <dsp:spPr>
         <a:xfrm>
-          <a:off x="4732478" y="2179183"/>
-          <a:ext cx="1317205" cy="658602"/>
+          <a:off x="4057074" y="1963363"/>
+          <a:ext cx="1128824" cy="564412"/>
         </a:xfrm>
         <a:prstGeom prst="rect">
           <a:avLst/>
@@ -5851,8 +6137,8 @@
         </a:p>
       </dsp:txBody>
       <dsp:txXfrm>
-        <a:off x="4732478" y="2179183"/>
-        <a:ext cx="1317205" cy="658602"/>
+        <a:off x="4057074" y="1963363"/>
+        <a:ext cx="1128824" cy="564412"/>
       </dsp:txXfrm>
     </dsp:sp>
     <dsp:sp modelId="{892BD28F-03E1-4D71-AD0F-AAFD29BCD7DF}">
@@ -5862,8 +6148,8 @@
       </dsp:nvSpPr>
       <dsp:spPr>
         <a:xfrm>
-          <a:off x="5061779" y="3114399"/>
-          <a:ext cx="1317205" cy="658602"/>
+          <a:off x="4339280" y="2764828"/>
+          <a:ext cx="1128824" cy="764406"/>
         </a:xfrm>
         <a:prstGeom prst="rect">
           <a:avLst/>
@@ -5920,8 +6206,147 @@
         </a:p>
       </dsp:txBody>
       <dsp:txXfrm>
-        <a:off x="5061779" y="3114399"/>
-        <a:ext cx="1317205" cy="658602"/>
+        <a:off x="4339280" y="2764828"/>
+        <a:ext cx="1128824" cy="764406"/>
+      </dsp:txXfrm>
+    </dsp:sp>
+    <dsp:sp modelId="{95818E8C-F0F7-42E9-8C3D-12C643641ED5}">
+      <dsp:nvSpPr>
+        <dsp:cNvPr id="0" name=""/>
+        <dsp:cNvSpPr/>
+      </dsp:nvSpPr>
+      <dsp:spPr>
+        <a:xfrm>
+          <a:off x="5422952" y="1963363"/>
+          <a:ext cx="1128824" cy="564412"/>
+        </a:xfrm>
+        <a:prstGeom prst="rect">
+          <a:avLst/>
+        </a:prstGeom>
+        <a:solidFill>
+          <a:schemeClr val="accent4">
+            <a:hueOff val="0"/>
+            <a:satOff val="0"/>
+            <a:lumOff val="0"/>
+            <a:alphaOff val="0"/>
+          </a:schemeClr>
+        </a:solidFill>
+        <a:ln>
+          <a:noFill/>
+        </a:ln>
+        <a:effectLst/>
+      </dsp:spPr>
+      <dsp:style>
+        <a:lnRef idx="0">
+          <a:scrgbClr r="0" g="0" b="0"/>
+        </a:lnRef>
+        <a:fillRef idx="3">
+          <a:scrgbClr r="0" g="0" b="0"/>
+        </a:fillRef>
+        <a:effectRef idx="2">
+          <a:scrgbClr r="0" g="0" b="0"/>
+        </a:effectRef>
+        <a:fontRef idx="minor">
+          <a:schemeClr val="lt1"/>
+        </a:fontRef>
+      </dsp:style>
+      <dsp:txBody>
+        <a:bodyPr spcFirstLastPara="0" vert="horz" wrap="square" lIns="8890" tIns="8890" rIns="8890" bIns="8890" numCol="1" spcCol="1270" anchor="ctr" anchorCtr="0">
+          <a:noAutofit/>
+        </a:bodyPr>
+        <a:lstStyle/>
+        <a:p>
+          <a:pPr marL="0" lvl="0" indent="0" algn="ctr" defTabSz="622300" rtl="0">
+            <a:lnSpc>
+              <a:spcPct val="90000"/>
+            </a:lnSpc>
+            <a:spcBef>
+              <a:spcPct val="0"/>
+            </a:spcBef>
+            <a:spcAft>
+              <a:spcPct val="35000"/>
+            </a:spcAft>
+            <a:buNone/>
+          </a:pPr>
+          <a:r>
+            <a:rPr lang="en-US" sz="1400" b="1" kern="1200"/>
+            <a:t>Class PhsrOutput</a:t>
+          </a:r>
+          <a:endParaRPr lang="en-US" sz="1400" kern="1200" dirty="0"/>
+        </a:p>
+      </dsp:txBody>
+      <dsp:txXfrm>
+        <a:off x="5422952" y="1963363"/>
+        <a:ext cx="1128824" cy="564412"/>
+      </dsp:txXfrm>
+    </dsp:sp>
+    <dsp:sp modelId="{C4412BE2-ECCF-406E-AA8E-B74753721C46}">
+      <dsp:nvSpPr>
+        <dsp:cNvPr id="0" name=""/>
+        <dsp:cNvSpPr/>
+      </dsp:nvSpPr>
+      <dsp:spPr>
+        <a:xfrm>
+          <a:off x="5705158" y="2764828"/>
+          <a:ext cx="1128824" cy="1230853"/>
+        </a:xfrm>
+        <a:prstGeom prst="rect">
+          <a:avLst/>
+        </a:prstGeom>
+        <a:solidFill>
+          <a:schemeClr val="accent5">
+            <a:hueOff val="0"/>
+            <a:satOff val="0"/>
+            <a:lumOff val="0"/>
+            <a:alphaOff val="0"/>
+          </a:schemeClr>
+        </a:solidFill>
+        <a:ln>
+          <a:noFill/>
+        </a:ln>
+        <a:effectLst/>
+      </dsp:spPr>
+      <dsp:style>
+        <a:lnRef idx="0">
+          <a:scrgbClr r="0" g="0" b="0"/>
+        </a:lnRef>
+        <a:fillRef idx="3">
+          <a:scrgbClr r="0" g="0" b="0"/>
+        </a:fillRef>
+        <a:effectRef idx="2">
+          <a:scrgbClr r="0" g="0" b="0"/>
+        </a:effectRef>
+        <a:fontRef idx="minor">
+          <a:schemeClr val="lt1"/>
+        </a:fontRef>
+      </dsp:style>
+      <dsp:txBody>
+        <a:bodyPr spcFirstLastPara="0" vert="horz" wrap="square" lIns="8890" tIns="8890" rIns="8890" bIns="8890" numCol="1" spcCol="1270" anchor="ctr" anchorCtr="0">
+          <a:noAutofit/>
+        </a:bodyPr>
+        <a:lstStyle/>
+        <a:p>
+          <a:pPr marL="0" lvl="0" indent="0" algn="ctr" defTabSz="622300" rtl="0">
+            <a:lnSpc>
+              <a:spcPct val="90000"/>
+            </a:lnSpc>
+            <a:spcBef>
+              <a:spcPct val="0"/>
+            </a:spcBef>
+            <a:spcAft>
+              <a:spcPct val="35000"/>
+            </a:spcAft>
+            <a:buNone/>
+          </a:pPr>
+          <a:r>
+            <a:rPr lang="en-US" sz="1400" kern="1200" dirty="0"/>
+            <a:t>Output list with all the info from Phaser</a:t>
+          </a:r>
+        </a:p>
+      </dsp:txBody>
+      <dsp:txXfrm>
+        <a:off x="5705158" y="2764828"/>
+        <a:ext cx="1128824" cy="1230853"/>
       </dsp:txXfrm>
     </dsp:sp>
     <dsp:sp modelId="{257BFB99-44CC-487D-A299-7181725AD144}">
@@ -5931,8 +6356,8 @@
       </dsp:nvSpPr>
       <dsp:spPr>
         <a:xfrm>
-          <a:off x="6655598" y="1243967"/>
-          <a:ext cx="1317205" cy="658602"/>
+          <a:off x="7071037" y="1161897"/>
+          <a:ext cx="1128824" cy="564412"/>
         </a:xfrm>
         <a:prstGeom prst="rect">
           <a:avLst/>
@@ -5989,8 +6414,8 @@
         </a:p>
       </dsp:txBody>
       <dsp:txXfrm>
-        <a:off x="6655598" y="1243967"/>
-        <a:ext cx="1317205" cy="658602"/>
+        <a:off x="7071037" y="1161897"/>
+        <a:ext cx="1128824" cy="564412"/>
       </dsp:txXfrm>
     </dsp:sp>
     <dsp:sp modelId="{9CB5ECF4-EE43-4B72-88EF-67DE06ABB8A3}">
@@ -6000,8 +6425,8 @@
       </dsp:nvSpPr>
       <dsp:spPr>
         <a:xfrm>
-          <a:off x="6655598" y="2179183"/>
-          <a:ext cx="1317205" cy="658602"/>
+          <a:off x="7071037" y="1963363"/>
+          <a:ext cx="1128824" cy="564412"/>
         </a:xfrm>
         <a:prstGeom prst="rect">
           <a:avLst/>
@@ -6058,8 +6483,8 @@
         </a:p>
       </dsp:txBody>
       <dsp:txXfrm>
-        <a:off x="6655598" y="2179183"/>
-        <a:ext cx="1317205" cy="658602"/>
+        <a:off x="7071037" y="1963363"/>
+        <a:ext cx="1128824" cy="564412"/>
       </dsp:txXfrm>
     </dsp:sp>
     <dsp:sp modelId="{B1B496CD-0410-4073-9E57-D5D3BB85915D}">
@@ -6069,8 +6494,8 @@
       </dsp:nvSpPr>
       <dsp:spPr>
         <a:xfrm>
-          <a:off x="6655598" y="3114399"/>
-          <a:ext cx="1317205" cy="658602"/>
+          <a:off x="7071037" y="2764828"/>
+          <a:ext cx="1128824" cy="564412"/>
         </a:xfrm>
         <a:prstGeom prst="rect">
           <a:avLst/>
@@ -6127,8 +6552,8 @@
         </a:p>
       </dsp:txBody>
       <dsp:txXfrm>
-        <a:off x="6655598" y="3114399"/>
-        <a:ext cx="1317205" cy="658602"/>
+        <a:off x="7071037" y="2764828"/>
+        <a:ext cx="1128824" cy="564412"/>
       </dsp:txXfrm>
     </dsp:sp>
     <dsp:sp modelId="{CFB12294-E7D1-4516-955D-80C81F04EDDE}">
@@ -6138,8 +6563,8 @@
       </dsp:nvSpPr>
       <dsp:spPr>
         <a:xfrm>
-          <a:off x="6984900" y="4049615"/>
-          <a:ext cx="1317205" cy="658602"/>
+          <a:off x="7353243" y="3566294"/>
+          <a:ext cx="1128824" cy="564412"/>
         </a:xfrm>
         <a:prstGeom prst="rect">
           <a:avLst/>
@@ -6196,8 +6621,8 @@
         </a:p>
       </dsp:txBody>
       <dsp:txXfrm>
-        <a:off x="6984900" y="4049615"/>
-        <a:ext cx="1317205" cy="658602"/>
+        <a:off x="7353243" y="3566294"/>
+        <a:ext cx="1128824" cy="564412"/>
       </dsp:txXfrm>
     </dsp:sp>
     <dsp:sp modelId="{6BB90D32-3A50-4834-BF3A-ADCBB4AEAC74}">
@@ -6207,8 +6632,8 @@
       </dsp:nvSpPr>
       <dsp:spPr>
         <a:xfrm>
-          <a:off x="8249417" y="1243967"/>
-          <a:ext cx="1317205" cy="658602"/>
+          <a:off x="8436915" y="1161897"/>
+          <a:ext cx="1128824" cy="564412"/>
         </a:xfrm>
         <a:prstGeom prst="rect">
           <a:avLst/>
@@ -6265,8 +6690,8 @@
         </a:p>
       </dsp:txBody>
       <dsp:txXfrm>
-        <a:off x="8249417" y="1243967"/>
-        <a:ext cx="1317205" cy="658602"/>
+        <a:off x="8436915" y="1161897"/>
+        <a:ext cx="1128824" cy="564412"/>
       </dsp:txXfrm>
     </dsp:sp>
     <dsp:sp modelId="{6BAD6C85-AEA6-421B-A9C9-082FF217BAC3}">
@@ -6276,8 +6701,8 @@
       </dsp:nvSpPr>
       <dsp:spPr>
         <a:xfrm>
-          <a:off x="8249417" y="2179183"/>
-          <a:ext cx="1317205" cy="658602"/>
+          <a:off x="8436915" y="1963363"/>
+          <a:ext cx="1128824" cy="564412"/>
         </a:xfrm>
         <a:prstGeom prst="rect">
           <a:avLst/>
@@ -6334,8 +6759,8 @@
         </a:p>
       </dsp:txBody>
       <dsp:txXfrm>
-        <a:off x="8249417" y="2179183"/>
-        <a:ext cx="1317205" cy="658602"/>
+        <a:off x="8436915" y="1963363"/>
+        <a:ext cx="1128824" cy="564412"/>
       </dsp:txXfrm>
     </dsp:sp>
   </dsp:spTree>
@@ -12716,7 +13141,7 @@
           <a:p>
             <a:fld id="{492C6B77-E49F-45BB-9AAD-64A3A65F64F8}" type="datetimeFigureOut">
               <a:rPr lang="en-US" smtClean="0"/>
-              <a:t>6/1/2021</a:t>
+              <a:t>6/8/2021</a:t>
             </a:fld>
             <a:endParaRPr lang="en-US"/>
           </a:p>
@@ -12914,7 +13339,7 @@
           <a:p>
             <a:fld id="{492C6B77-E49F-45BB-9AAD-64A3A65F64F8}" type="datetimeFigureOut">
               <a:rPr lang="en-US" smtClean="0"/>
-              <a:t>6/1/2021</a:t>
+              <a:t>6/8/2021</a:t>
             </a:fld>
             <a:endParaRPr lang="en-US"/>
           </a:p>
@@ -13122,7 +13547,7 @@
           <a:p>
             <a:fld id="{492C6B77-E49F-45BB-9AAD-64A3A65F64F8}" type="datetimeFigureOut">
               <a:rPr lang="en-US" smtClean="0"/>
-              <a:t>6/1/2021</a:t>
+              <a:t>6/8/2021</a:t>
             </a:fld>
             <a:endParaRPr lang="en-US"/>
           </a:p>
@@ -13320,7 +13745,7 @@
           <a:p>
             <a:fld id="{492C6B77-E49F-45BB-9AAD-64A3A65F64F8}" type="datetimeFigureOut">
               <a:rPr lang="en-US" smtClean="0"/>
-              <a:t>6/1/2021</a:t>
+              <a:t>6/8/2021</a:t>
             </a:fld>
             <a:endParaRPr lang="en-US"/>
           </a:p>
@@ -13595,7 +14020,7 @@
           <a:p>
             <a:fld id="{492C6B77-E49F-45BB-9AAD-64A3A65F64F8}" type="datetimeFigureOut">
               <a:rPr lang="en-US" smtClean="0"/>
-              <a:t>6/1/2021</a:t>
+              <a:t>6/8/2021</a:t>
             </a:fld>
             <a:endParaRPr lang="en-US"/>
           </a:p>
@@ -13860,7 +14285,7 @@
           <a:p>
             <a:fld id="{492C6B77-E49F-45BB-9AAD-64A3A65F64F8}" type="datetimeFigureOut">
               <a:rPr lang="en-US" smtClean="0"/>
-              <a:t>6/1/2021</a:t>
+              <a:t>6/8/2021</a:t>
             </a:fld>
             <a:endParaRPr lang="en-US"/>
           </a:p>
@@ -14272,7 +14697,7 @@
           <a:p>
             <a:fld id="{492C6B77-E49F-45BB-9AAD-64A3A65F64F8}" type="datetimeFigureOut">
               <a:rPr lang="en-US" smtClean="0"/>
-              <a:t>6/1/2021</a:t>
+              <a:t>6/8/2021</a:t>
             </a:fld>
             <a:endParaRPr lang="en-US"/>
           </a:p>
@@ -14413,7 +14838,7 @@
           <a:p>
             <a:fld id="{492C6B77-E49F-45BB-9AAD-64A3A65F64F8}" type="datetimeFigureOut">
               <a:rPr lang="en-US" smtClean="0"/>
-              <a:t>6/1/2021</a:t>
+              <a:t>6/8/2021</a:t>
             </a:fld>
             <a:endParaRPr lang="en-US"/>
           </a:p>
@@ -14526,7 +14951,7 @@
           <a:p>
             <a:fld id="{492C6B77-E49F-45BB-9AAD-64A3A65F64F8}" type="datetimeFigureOut">
               <a:rPr lang="en-US" smtClean="0"/>
-              <a:t>6/1/2021</a:t>
+              <a:t>6/8/2021</a:t>
             </a:fld>
             <a:endParaRPr lang="en-US"/>
           </a:p>
@@ -14837,7 +15262,7 @@
           <a:p>
             <a:fld id="{492C6B77-E49F-45BB-9AAD-64A3A65F64F8}" type="datetimeFigureOut">
               <a:rPr lang="en-US" smtClean="0"/>
-              <a:t>6/1/2021</a:t>
+              <a:t>6/8/2021</a:t>
             </a:fld>
             <a:endParaRPr lang="en-US"/>
           </a:p>
@@ -15128,7 +15553,7 @@
           <a:p>
             <a:fld id="{492C6B77-E49F-45BB-9AAD-64A3A65F64F8}" type="datetimeFigureOut">
               <a:rPr lang="en-US" smtClean="0"/>
-              <a:t>6/1/2021</a:t>
+              <a:t>6/8/2021</a:t>
             </a:fld>
             <a:endParaRPr lang="en-US"/>
           </a:p>
@@ -15369,7 +15794,7 @@
           <a:p>
             <a:fld id="{492C6B77-E49F-45BB-9AAD-64A3A65F64F8}" type="datetimeFigureOut">
               <a:rPr lang="en-US" smtClean="0"/>
-              <a:t>6/1/2021</a:t>
+              <a:t>6/8/2021</a:t>
             </a:fld>
             <a:endParaRPr lang="en-US"/>
           </a:p>
@@ -15799,7 +16224,7 @@
           <p:nvPr>
             <p:extLst>
               <p:ext uri="{D42A27DB-BD31-4B8C-83A1-F6EECF244321}">
-                <p14:modId xmlns:p14="http://schemas.microsoft.com/office/powerpoint/2010/main" val="2778839563"/>
+                <p14:modId xmlns:p14="http://schemas.microsoft.com/office/powerpoint/2010/main" val="3341074476"/>
               </p:ext>
             </p:extLst>
           </p:nvPr>

</xml_diff>